<commit_message>
Added all submission artifacts and pulled all repos forward
</commit_message>
<xml_diff>
--- a/submission-artifacts/PointOfSaleSystem_HaysMatthew_JoshuaWellman.pptx
+++ b/submission-artifacts/PointOfSaleSystem_HaysMatthew_JoshuaWellman.pptx
@@ -5,7 +5,7 @@
     <p:sldMasterId id="2147483704" r:id="rId1"/>
   </p:sldMasterIdLst>
   <p:notesMasterIdLst>
-    <p:notesMasterId r:id="rId11"/>
+    <p:notesMasterId r:id="rId17"/>
   </p:notesMasterIdLst>
   <p:sldIdLst>
     <p:sldId id="257" r:id="rId2"/>
@@ -16,7 +16,13 @@
     <p:sldId id="269" r:id="rId7"/>
     <p:sldId id="270" r:id="rId8"/>
     <p:sldId id="271" r:id="rId9"/>
-    <p:sldId id="272" r:id="rId10"/>
+    <p:sldId id="277" r:id="rId10"/>
+    <p:sldId id="274" r:id="rId11"/>
+    <p:sldId id="272" r:id="rId12"/>
+    <p:sldId id="278" r:id="rId13"/>
+    <p:sldId id="275" r:id="rId14"/>
+    <p:sldId id="276" r:id="rId15"/>
+    <p:sldId id="273" r:id="rId16"/>
   </p:sldIdLst>
   <p:sldSz cx="12192000" cy="6858000"/>
   <p:notesSz cx="6858000" cy="9144000"/>
@@ -158,7 +164,13 @@
             <p14:sldId id="269"/>
             <p14:sldId id="270"/>
             <p14:sldId id="271"/>
+            <p14:sldId id="277"/>
+            <p14:sldId id="274"/>
             <p14:sldId id="272"/>
+            <p14:sldId id="278"/>
+            <p14:sldId id="275"/>
+            <p14:sldId id="276"/>
+            <p14:sldId id="273"/>
           </p14:sldIdLst>
         </p14:section>
       </p14:sectionLst>
@@ -168,6 +180,190 @@
     </p:ext>
   </p:extLst>
 </p:presentation>
+</file>
+
+<file path=ppt/revisionInfo.xml><?xml version="1.0" encoding="utf-8"?>
+<p1510:revInfo xmlns:a="http://schemas.openxmlformats.org/drawingml/2006/main" xmlns:r="http://schemas.openxmlformats.org/officeDocument/2006/relationships" xmlns:p1510="http://schemas.microsoft.com/office/powerpoint/2015/10/main">
+  <p1510:revLst>
+    <p1510:client id="{BDFE168F-239F-E8F7-6B7D-91A7FE11F01F}" v="341" dt="2025-02-20T02:06:55.159"/>
+  </p1510:revLst>
+</p1510:revInfo>
+</file>
+
+<file path=ppt/changesInfos/changesInfo1.xml><?xml version="1.0" encoding="utf-8"?>
+<pc:chgInfo xmlns:a="http://schemas.openxmlformats.org/drawingml/2006/main" xmlns:r="http://schemas.openxmlformats.org/officeDocument/2006/relationships" xmlns:ac="http://schemas.microsoft.com/office/drawing/2013/main/command" xmlns:pc="http://schemas.microsoft.com/office/powerpoint/2013/main/command">
+  <pc:docChgLst>
+    <pc:chgData name="Wellman, Joshua" userId="S::joshua_wellman1@baylor.edu::1f8a2836-7ea3-43b6-91a8-337e6222d6b2" providerId="AD" clId="Web-{BDFE168F-239F-E8F7-6B7D-91A7FE11F01F}"/>
+    <pc:docChg chg="addSld modSld sldOrd modSection">
+      <pc:chgData name="Wellman, Joshua" userId="S::joshua_wellman1@baylor.edu::1f8a2836-7ea3-43b6-91a8-337e6222d6b2" providerId="AD" clId="Web-{BDFE168F-239F-E8F7-6B7D-91A7FE11F01F}" dt="2025-02-20T02:06:52.925" v="323" actId="20577"/>
+      <pc:docMkLst>
+        <pc:docMk/>
+      </pc:docMkLst>
+      <pc:sldChg chg="ord">
+        <pc:chgData name="Wellman, Joshua" userId="S::joshua_wellman1@baylor.edu::1f8a2836-7ea3-43b6-91a8-337e6222d6b2" providerId="AD" clId="Web-{BDFE168F-239F-E8F7-6B7D-91A7FE11F01F}" dt="2025-02-20T00:34:39.229" v="44"/>
+        <pc:sldMkLst>
+          <pc:docMk/>
+          <pc:sldMk cId="3228207406" sldId="272"/>
+        </pc:sldMkLst>
+      </pc:sldChg>
+      <pc:sldChg chg="addSp modSp new ord">
+        <pc:chgData name="Wellman, Joshua" userId="S::joshua_wellman1@baylor.edu::1f8a2836-7ea3-43b6-91a8-337e6222d6b2" providerId="AD" clId="Web-{BDFE168F-239F-E8F7-6B7D-91A7FE11F01F}" dt="2025-02-20T01:15:21.872" v="237" actId="1076"/>
+        <pc:sldMkLst>
+          <pc:docMk/>
+          <pc:sldMk cId="1725777591" sldId="273"/>
+        </pc:sldMkLst>
+        <pc:spChg chg="add mod">
+          <ac:chgData name="Wellman, Joshua" userId="S::joshua_wellman1@baylor.edu::1f8a2836-7ea3-43b6-91a8-337e6222d6b2" providerId="AD" clId="Web-{BDFE168F-239F-E8F7-6B7D-91A7FE11F01F}" dt="2025-02-20T01:15:21.872" v="237" actId="1076"/>
+          <ac:spMkLst>
+            <pc:docMk/>
+            <pc:sldMk cId="1725777591" sldId="273"/>
+            <ac:spMk id="2" creationId="{12E3C16C-EB33-8FAD-1CCB-86B5F1F466AD}"/>
+          </ac:spMkLst>
+        </pc:spChg>
+      </pc:sldChg>
+      <pc:sldChg chg="addSp delSp modSp add replId">
+        <pc:chgData name="Wellman, Joshua" userId="S::joshua_wellman1@baylor.edu::1f8a2836-7ea3-43b6-91a8-337e6222d6b2" providerId="AD" clId="Web-{BDFE168F-239F-E8F7-6B7D-91A7FE11F01F}" dt="2025-02-20T01:13:58.510" v="232" actId="1076"/>
+        <pc:sldMkLst>
+          <pc:docMk/>
+          <pc:sldMk cId="697341776" sldId="274"/>
+        </pc:sldMkLst>
+        <pc:spChg chg="mod">
+          <ac:chgData name="Wellman, Joshua" userId="S::joshua_wellman1@baylor.edu::1f8a2836-7ea3-43b6-91a8-337e6222d6b2" providerId="AD" clId="Web-{BDFE168F-239F-E8F7-6B7D-91A7FE11F01F}" dt="2025-02-20T00:16:32.592" v="16" actId="20577"/>
+          <ac:spMkLst>
+            <pc:docMk/>
+            <pc:sldMk cId="697341776" sldId="274"/>
+            <ac:spMk id="2" creationId="{BBF13E05-D8DC-7543-6877-4B17AB95FDB0}"/>
+          </ac:spMkLst>
+        </pc:spChg>
+        <pc:picChg chg="add mod">
+          <ac:chgData name="Wellman, Joshua" userId="S::joshua_wellman1@baylor.edu::1f8a2836-7ea3-43b6-91a8-337e6222d6b2" providerId="AD" clId="Web-{BDFE168F-239F-E8F7-6B7D-91A7FE11F01F}" dt="2025-02-20T01:13:58.510" v="232" actId="1076"/>
+          <ac:picMkLst>
+            <pc:docMk/>
+            <pc:sldMk cId="697341776" sldId="274"/>
+            <ac:picMk id="4" creationId="{EC1057BC-A4C0-5A60-44AD-CBA0940E9474}"/>
+          </ac:picMkLst>
+        </pc:picChg>
+        <pc:picChg chg="del">
+          <ac:chgData name="Wellman, Joshua" userId="S::joshua_wellman1@baylor.edu::1f8a2836-7ea3-43b6-91a8-337e6222d6b2" providerId="AD" clId="Web-{BDFE168F-239F-E8F7-6B7D-91A7FE11F01F}" dt="2025-02-20T00:21:35.088" v="17"/>
+          <ac:picMkLst>
+            <pc:docMk/>
+            <pc:sldMk cId="697341776" sldId="274"/>
+            <ac:picMk id="6" creationId="{CF7D21A9-FCEE-1993-5659-FEE3582E7375}"/>
+          </ac:picMkLst>
+        </pc:picChg>
+      </pc:sldChg>
+      <pc:sldChg chg="addSp modSp add replId">
+        <pc:chgData name="Wellman, Joshua" userId="S::joshua_wellman1@baylor.edu::1f8a2836-7ea3-43b6-91a8-337e6222d6b2" providerId="AD" clId="Web-{BDFE168F-239F-E8F7-6B7D-91A7FE11F01F}" dt="2025-02-20T00:34:24.853" v="43" actId="1076"/>
+        <pc:sldMkLst>
+          <pc:docMk/>
+          <pc:sldMk cId="947546317" sldId="275"/>
+        </pc:sldMkLst>
+        <pc:spChg chg="mod">
+          <ac:chgData name="Wellman, Joshua" userId="S::joshua_wellman1@baylor.edu::1f8a2836-7ea3-43b6-91a8-337e6222d6b2" providerId="AD" clId="Web-{BDFE168F-239F-E8F7-6B7D-91A7FE11F01F}" dt="2025-02-20T00:28:19.604" v="40" actId="20577"/>
+          <ac:spMkLst>
+            <pc:docMk/>
+            <pc:sldMk cId="947546317" sldId="275"/>
+            <ac:spMk id="2" creationId="{D961AA19-0460-4DB2-4EBB-6986CA01BF46}"/>
+          </ac:spMkLst>
+        </pc:spChg>
+        <pc:picChg chg="add mod">
+          <ac:chgData name="Wellman, Joshua" userId="S::joshua_wellman1@baylor.edu::1f8a2836-7ea3-43b6-91a8-337e6222d6b2" providerId="AD" clId="Web-{BDFE168F-239F-E8F7-6B7D-91A7FE11F01F}" dt="2025-02-20T00:34:24.853" v="43" actId="1076"/>
+          <ac:picMkLst>
+            <pc:docMk/>
+            <pc:sldMk cId="947546317" sldId="275"/>
+            <ac:picMk id="4" creationId="{80E740E1-04F7-9CB4-31E0-7D0B52A99270}"/>
+          </ac:picMkLst>
+        </pc:picChg>
+      </pc:sldChg>
+      <pc:sldChg chg="addSp delSp modSp add ord replId">
+        <pc:chgData name="Wellman, Joshua" userId="S::joshua_wellman1@baylor.edu::1f8a2836-7ea3-43b6-91a8-337e6222d6b2" providerId="AD" clId="Web-{BDFE168F-239F-E8F7-6B7D-91A7FE11F01F}" dt="2025-02-20T02:06:52.925" v="323" actId="20577"/>
+        <pc:sldMkLst>
+          <pc:docMk/>
+          <pc:sldMk cId="3133002383" sldId="276"/>
+        </pc:sldMkLst>
+        <pc:spChg chg="mod">
+          <ac:chgData name="Wellman, Joshua" userId="S::joshua_wellman1@baylor.edu::1f8a2836-7ea3-43b6-91a8-337e6222d6b2" providerId="AD" clId="Web-{BDFE168F-239F-E8F7-6B7D-91A7FE11F01F}" dt="2025-02-20T00:37:48.970" v="51" actId="20577"/>
+          <ac:spMkLst>
+            <pc:docMk/>
+            <pc:sldMk cId="3133002383" sldId="276"/>
+            <ac:spMk id="2" creationId="{192DB44F-A69B-E1CC-FB1A-2D2049001179}"/>
+          </ac:spMkLst>
+        </pc:spChg>
+        <pc:spChg chg="del">
+          <ac:chgData name="Wellman, Joshua" userId="S::joshua_wellman1@baylor.edu::1f8a2836-7ea3-43b6-91a8-337e6222d6b2" providerId="AD" clId="Web-{BDFE168F-239F-E8F7-6B7D-91A7FE11F01F}" dt="2025-02-20T00:37:57.049" v="52"/>
+          <ac:spMkLst>
+            <pc:docMk/>
+            <pc:sldMk cId="3133002383" sldId="276"/>
+            <ac:spMk id="3" creationId="{7F1A6E27-CB51-6E65-3BEF-92FE9D386D9E}"/>
+          </ac:spMkLst>
+        </pc:spChg>
+        <pc:spChg chg="add mod">
+          <ac:chgData name="Wellman, Joshua" userId="S::joshua_wellman1@baylor.edu::1f8a2836-7ea3-43b6-91a8-337e6222d6b2" providerId="AD" clId="Web-{BDFE168F-239F-E8F7-6B7D-91A7FE11F01F}" dt="2025-02-20T02:06:52.925" v="323" actId="20577"/>
+          <ac:spMkLst>
+            <pc:docMk/>
+            <pc:sldMk cId="3133002383" sldId="276"/>
+            <ac:spMk id="5" creationId="{9034ADCF-916C-4D20-4F16-8086C565F7EC}"/>
+          </ac:spMkLst>
+        </pc:spChg>
+      </pc:sldChg>
+      <pc:sldChg chg="addSp delSp modSp add replId">
+        <pc:chgData name="Wellman, Joshua" userId="S::joshua_wellman1@baylor.edu::1f8a2836-7ea3-43b6-91a8-337e6222d6b2" providerId="AD" clId="Web-{BDFE168F-239F-E8F7-6B7D-91A7FE11F01F}" dt="2025-02-20T01:50:36.776" v="280" actId="1076"/>
+        <pc:sldMkLst>
+          <pc:docMk/>
+          <pc:sldMk cId="4210925812" sldId="277"/>
+        </pc:sldMkLst>
+        <pc:spChg chg="mod">
+          <ac:chgData name="Wellman, Joshua" userId="S::joshua_wellman1@baylor.edu::1f8a2836-7ea3-43b6-91a8-337e6222d6b2" providerId="AD" clId="Web-{BDFE168F-239F-E8F7-6B7D-91A7FE11F01F}" dt="2025-02-20T01:47:57.632" v="260" actId="20577"/>
+          <ac:spMkLst>
+            <pc:docMk/>
+            <pc:sldMk cId="4210925812" sldId="277"/>
+            <ac:spMk id="2" creationId="{31DF4D76-F1E6-E0E1-07EE-441B6EEE5F77}"/>
+          </ac:spMkLst>
+        </pc:spChg>
+        <pc:picChg chg="add mod">
+          <ac:chgData name="Wellman, Joshua" userId="S::joshua_wellman1@baylor.edu::1f8a2836-7ea3-43b6-91a8-337e6222d6b2" providerId="AD" clId="Web-{BDFE168F-239F-E8F7-6B7D-91A7FE11F01F}" dt="2025-02-20T01:50:28.370" v="278" actId="1076"/>
+          <ac:picMkLst>
+            <pc:docMk/>
+            <pc:sldMk cId="4210925812" sldId="277"/>
+            <ac:picMk id="4" creationId="{6DA0F377-A74A-E11E-7016-367D25F2B41D}"/>
+          </ac:picMkLst>
+        </pc:picChg>
+        <pc:picChg chg="add del mod">
+          <ac:chgData name="Wellman, Joshua" userId="S::joshua_wellman1@baylor.edu::1f8a2836-7ea3-43b6-91a8-337e6222d6b2" providerId="AD" clId="Web-{BDFE168F-239F-E8F7-6B7D-91A7FE11F01F}" dt="2025-02-20T01:48:57.680" v="269"/>
+          <ac:picMkLst>
+            <pc:docMk/>
+            <pc:sldMk cId="4210925812" sldId="277"/>
+            <ac:picMk id="5" creationId="{EA8F50B0-5C6A-2F6B-281E-B16E939724DB}"/>
+          </ac:picMkLst>
+        </pc:picChg>
+        <pc:picChg chg="del">
+          <ac:chgData name="Wellman, Joshua" userId="S::joshua_wellman1@baylor.edu::1f8a2836-7ea3-43b6-91a8-337e6222d6b2" providerId="AD" clId="Web-{BDFE168F-239F-E8F7-6B7D-91A7FE11F01F}" dt="2025-02-20T01:48:00.101" v="261"/>
+          <ac:picMkLst>
+            <pc:docMk/>
+            <pc:sldMk cId="4210925812" sldId="277"/>
+            <ac:picMk id="6" creationId="{45A64F81-D54D-9BAF-8965-A392621DB657}"/>
+          </ac:picMkLst>
+        </pc:picChg>
+        <pc:picChg chg="add mod">
+          <ac:chgData name="Wellman, Joshua" userId="S::joshua_wellman1@baylor.edu::1f8a2836-7ea3-43b6-91a8-337e6222d6b2" providerId="AD" clId="Web-{BDFE168F-239F-E8F7-6B7D-91A7FE11F01F}" dt="2025-02-20T01:50:33.589" v="279" actId="1076"/>
+          <ac:picMkLst>
+            <pc:docMk/>
+            <pc:sldMk cId="4210925812" sldId="277"/>
+            <ac:picMk id="7" creationId="{85A21BF1-811F-D95B-03B9-8A50529CA514}"/>
+          </ac:picMkLst>
+        </pc:picChg>
+        <pc:picChg chg="add mod">
+          <ac:chgData name="Wellman, Joshua" userId="S::joshua_wellman1@baylor.edu::1f8a2836-7ea3-43b6-91a8-337e6222d6b2" providerId="AD" clId="Web-{BDFE168F-239F-E8F7-6B7D-91A7FE11F01F}" dt="2025-02-20T01:50:36.776" v="280" actId="1076"/>
+          <ac:picMkLst>
+            <pc:docMk/>
+            <pc:sldMk cId="4210925812" sldId="277"/>
+            <ac:picMk id="8" creationId="{6541432F-C446-0DC6-0384-1EA0A0510B4B}"/>
+          </ac:picMkLst>
+        </pc:picChg>
+      </pc:sldChg>
+    </pc:docChg>
+  </pc:docChgLst>
+</pc:chgInfo>
 </file>
 
 <file path=ppt/notesMasters/notesMaster1.xml><?xml version="1.0" encoding="utf-8"?>
@@ -252,7 +448,7 @@
           <a:p>
             <a:fld id="{B88425FB-99A0-784A-8908-78580D3AABBF}" type="datetimeFigureOut">
               <a:rPr lang="en-US" smtClean="0"/>
-              <a:t>2/18/25</a:t>
+              <a:t>2/19/25</a:t>
             </a:fld>
             <a:endParaRPr lang="en-US"/>
           </a:p>
@@ -584,6 +780,630 @@
           <a:p>
             <a:fld id="{4D8A794E-8D33-1A42-A949-5F1CC9046FB7}" type="slidenum">
               <a:rPr lang="en-US" smtClean="0"/>
+              <a:t>1</a:t>
+            </a:fld>
+            <a:endParaRPr lang="en-US"/>
+          </a:p>
+        </p:txBody>
+      </p:sp>
+    </p:spTree>
+    <p:extLst>
+      <p:ext uri="{BB962C8B-B14F-4D97-AF65-F5344CB8AC3E}">
+        <p14:creationId xmlns:p14="http://schemas.microsoft.com/office/powerpoint/2010/main" val="2803398953"/>
+      </p:ext>
+    </p:extLst>
+  </p:cSld>
+  <p:clrMapOvr>
+    <a:masterClrMapping/>
+  </p:clrMapOvr>
+</p:notes>
+</file>
+
+<file path=ppt/notesSlides/notesSlide10.xml><?xml version="1.0" encoding="utf-8"?>
+<p:notes xmlns:a="http://schemas.openxmlformats.org/drawingml/2006/main" xmlns:r="http://schemas.openxmlformats.org/officeDocument/2006/relationships" xmlns:p="http://schemas.openxmlformats.org/presentationml/2006/main">
+  <p:cSld>
+    <p:spTree>
+      <p:nvGrpSpPr>
+        <p:cNvPr id="1" name="">
+          <a:extLst>
+            <a:ext uri="{FF2B5EF4-FFF2-40B4-BE49-F238E27FC236}">
+              <a16:creationId xmlns:a16="http://schemas.microsoft.com/office/drawing/2014/main" id="{F02C181F-41AA-3746-DDA8-74CE4AC354C4}"/>
+            </a:ext>
+          </a:extLst>
+        </p:cNvPr>
+        <p:cNvGrpSpPr/>
+        <p:nvPr/>
+      </p:nvGrpSpPr>
+      <p:grpSpPr>
+        <a:xfrm>
+          <a:off x="0" y="0"/>
+          <a:ext cx="0" cy="0"/>
+          <a:chOff x="0" y="0"/>
+          <a:chExt cx="0" cy="0"/>
+        </a:xfrm>
+      </p:grpSpPr>
+      <p:sp>
+        <p:nvSpPr>
+          <p:cNvPr id="2" name="Slide Image Placeholder 1">
+            <a:extLst>
+              <a:ext uri="{FF2B5EF4-FFF2-40B4-BE49-F238E27FC236}">
+                <a16:creationId xmlns:a16="http://schemas.microsoft.com/office/drawing/2014/main" id="{96A23976-C13B-4FA2-5D76-6A13F9815542}"/>
+              </a:ext>
+            </a:extLst>
+          </p:cNvPr>
+          <p:cNvSpPr>
+            <a:spLocks noGrp="1" noRot="1" noChangeAspect="1"/>
+          </p:cNvSpPr>
+          <p:nvPr>
+            <p:ph type="sldImg"/>
+          </p:nvPr>
+        </p:nvSpPr>
+        <p:spPr/>
+      </p:sp>
+      <p:sp>
+        <p:nvSpPr>
+          <p:cNvPr id="3" name="Notes Placeholder 2">
+            <a:extLst>
+              <a:ext uri="{FF2B5EF4-FFF2-40B4-BE49-F238E27FC236}">
+                <a16:creationId xmlns:a16="http://schemas.microsoft.com/office/drawing/2014/main" id="{1C6B2316-0168-6154-6E1C-D149A82ED07A}"/>
+              </a:ext>
+            </a:extLst>
+          </p:cNvPr>
+          <p:cNvSpPr>
+            <a:spLocks noGrp="1"/>
+          </p:cNvSpPr>
+          <p:nvPr>
+            <p:ph type="body" idx="1"/>
+          </p:nvPr>
+        </p:nvSpPr>
+        <p:spPr/>
+        <p:txBody>
+          <a:bodyPr/>
+          <a:lstStyle/>
+          <a:p>
+            <a:endParaRPr lang="en-US"/>
+          </a:p>
+        </p:txBody>
+      </p:sp>
+      <p:sp>
+        <p:nvSpPr>
+          <p:cNvPr id="4" name="Slide Number Placeholder 3">
+            <a:extLst>
+              <a:ext uri="{FF2B5EF4-FFF2-40B4-BE49-F238E27FC236}">
+                <a16:creationId xmlns:a16="http://schemas.microsoft.com/office/drawing/2014/main" id="{F805C9A7-B4FC-2BA3-FB4F-9204CA27E861}"/>
+              </a:ext>
+            </a:extLst>
+          </p:cNvPr>
+          <p:cNvSpPr>
+            <a:spLocks noGrp="1"/>
+          </p:cNvSpPr>
+          <p:nvPr>
+            <p:ph type="sldNum" sz="quarter" idx="5"/>
+          </p:nvPr>
+        </p:nvSpPr>
+        <p:spPr/>
+        <p:txBody>
+          <a:bodyPr/>
+          <a:lstStyle/>
+          <a:p>
+            <a:fld id="{4D8A794E-8D33-1A42-A949-5F1CC9046FB7}" type="slidenum">
+              <a:rPr lang="en-US" smtClean="0"/>
+              <a:t>10</a:t>
+            </a:fld>
+            <a:endParaRPr lang="en-US"/>
+          </a:p>
+        </p:txBody>
+      </p:sp>
+    </p:spTree>
+    <p:extLst>
+      <p:ext uri="{BB962C8B-B14F-4D97-AF65-F5344CB8AC3E}">
+        <p14:creationId xmlns:p14="http://schemas.microsoft.com/office/powerpoint/2010/main" val="2872460251"/>
+      </p:ext>
+    </p:extLst>
+  </p:cSld>
+  <p:clrMapOvr>
+    <a:masterClrMapping/>
+  </p:clrMapOvr>
+</p:notes>
+</file>
+
+<file path=ppt/notesSlides/notesSlide11.xml><?xml version="1.0" encoding="utf-8"?>
+<p:notes xmlns:a="http://schemas.openxmlformats.org/drawingml/2006/main" xmlns:r="http://schemas.openxmlformats.org/officeDocument/2006/relationships" xmlns:p="http://schemas.openxmlformats.org/presentationml/2006/main">
+  <p:cSld>
+    <p:spTree>
+      <p:nvGrpSpPr>
+        <p:cNvPr id="1" name="">
+          <a:extLst>
+            <a:ext uri="{FF2B5EF4-FFF2-40B4-BE49-F238E27FC236}">
+              <a16:creationId xmlns:a16="http://schemas.microsoft.com/office/drawing/2014/main" id="{29B795F7-5D0A-5AE0-3670-FF03958601D5}"/>
+            </a:ext>
+          </a:extLst>
+        </p:cNvPr>
+        <p:cNvGrpSpPr/>
+        <p:nvPr/>
+      </p:nvGrpSpPr>
+      <p:grpSpPr>
+        <a:xfrm>
+          <a:off x="0" y="0"/>
+          <a:ext cx="0" cy="0"/>
+          <a:chOff x="0" y="0"/>
+          <a:chExt cx="0" cy="0"/>
+        </a:xfrm>
+      </p:grpSpPr>
+      <p:sp>
+        <p:nvSpPr>
+          <p:cNvPr id="2" name="Slide Image Placeholder 1">
+            <a:extLst>
+              <a:ext uri="{FF2B5EF4-FFF2-40B4-BE49-F238E27FC236}">
+                <a16:creationId xmlns:a16="http://schemas.microsoft.com/office/drawing/2014/main" id="{76EFA9DD-0045-7682-ECF8-F675920758FF}"/>
+              </a:ext>
+            </a:extLst>
+          </p:cNvPr>
+          <p:cNvSpPr>
+            <a:spLocks noGrp="1" noRot="1" noChangeAspect="1"/>
+          </p:cNvSpPr>
+          <p:nvPr>
+            <p:ph type="sldImg"/>
+          </p:nvPr>
+        </p:nvSpPr>
+        <p:spPr/>
+      </p:sp>
+      <p:sp>
+        <p:nvSpPr>
+          <p:cNvPr id="3" name="Notes Placeholder 2">
+            <a:extLst>
+              <a:ext uri="{FF2B5EF4-FFF2-40B4-BE49-F238E27FC236}">
+                <a16:creationId xmlns:a16="http://schemas.microsoft.com/office/drawing/2014/main" id="{2BDF0B36-1631-EE5A-6DC7-A9BF220D1D04}"/>
+              </a:ext>
+            </a:extLst>
+          </p:cNvPr>
+          <p:cNvSpPr>
+            <a:spLocks noGrp="1"/>
+          </p:cNvSpPr>
+          <p:nvPr>
+            <p:ph type="body" idx="1"/>
+          </p:nvPr>
+        </p:nvSpPr>
+        <p:spPr/>
+        <p:txBody>
+          <a:bodyPr/>
+          <a:lstStyle/>
+          <a:p>
+            <a:endParaRPr lang="en-US"/>
+          </a:p>
+        </p:txBody>
+      </p:sp>
+      <p:sp>
+        <p:nvSpPr>
+          <p:cNvPr id="4" name="Slide Number Placeholder 3">
+            <a:extLst>
+              <a:ext uri="{FF2B5EF4-FFF2-40B4-BE49-F238E27FC236}">
+                <a16:creationId xmlns:a16="http://schemas.microsoft.com/office/drawing/2014/main" id="{FB8AD123-5842-81FA-9EED-14A7D3FBDC47}"/>
+              </a:ext>
+            </a:extLst>
+          </p:cNvPr>
+          <p:cNvSpPr>
+            <a:spLocks noGrp="1"/>
+          </p:cNvSpPr>
+          <p:nvPr>
+            <p:ph type="sldNum" sz="quarter" idx="5"/>
+          </p:nvPr>
+        </p:nvSpPr>
+        <p:spPr/>
+        <p:txBody>
+          <a:bodyPr/>
+          <a:lstStyle/>
+          <a:p>
+            <a:fld id="{4D8A794E-8D33-1A42-A949-5F1CC9046FB7}" type="slidenum">
+              <a:rPr lang="en-US" smtClean="0"/>
+              <a:t>11</a:t>
+            </a:fld>
+            <a:endParaRPr lang="en-US"/>
+          </a:p>
+        </p:txBody>
+      </p:sp>
+    </p:spTree>
+    <p:extLst>
+      <p:ext uri="{BB962C8B-B14F-4D97-AF65-F5344CB8AC3E}">
+        <p14:creationId xmlns:p14="http://schemas.microsoft.com/office/powerpoint/2010/main" val="1911247430"/>
+      </p:ext>
+    </p:extLst>
+  </p:cSld>
+  <p:clrMapOvr>
+    <a:masterClrMapping/>
+  </p:clrMapOvr>
+</p:notes>
+</file>
+
+<file path=ppt/notesSlides/notesSlide12.xml><?xml version="1.0" encoding="utf-8"?>
+<p:notes xmlns:a="http://schemas.openxmlformats.org/drawingml/2006/main" xmlns:r="http://schemas.openxmlformats.org/officeDocument/2006/relationships" xmlns:p="http://schemas.openxmlformats.org/presentationml/2006/main">
+  <p:cSld>
+    <p:spTree>
+      <p:nvGrpSpPr>
+        <p:cNvPr id="1" name="">
+          <a:extLst>
+            <a:ext uri="{FF2B5EF4-FFF2-40B4-BE49-F238E27FC236}">
+              <a16:creationId xmlns:a16="http://schemas.microsoft.com/office/drawing/2014/main" id="{6410DBFC-365A-93C4-38FC-83B0231A11AB}"/>
+            </a:ext>
+          </a:extLst>
+        </p:cNvPr>
+        <p:cNvGrpSpPr/>
+        <p:nvPr/>
+      </p:nvGrpSpPr>
+      <p:grpSpPr>
+        <a:xfrm>
+          <a:off x="0" y="0"/>
+          <a:ext cx="0" cy="0"/>
+          <a:chOff x="0" y="0"/>
+          <a:chExt cx="0" cy="0"/>
+        </a:xfrm>
+      </p:grpSpPr>
+      <p:sp>
+        <p:nvSpPr>
+          <p:cNvPr id="2" name="Slide Image Placeholder 1">
+            <a:extLst>
+              <a:ext uri="{FF2B5EF4-FFF2-40B4-BE49-F238E27FC236}">
+                <a16:creationId xmlns:a16="http://schemas.microsoft.com/office/drawing/2014/main" id="{5156E6E2-216F-9F13-5B55-A18FF03F4607}"/>
+              </a:ext>
+            </a:extLst>
+          </p:cNvPr>
+          <p:cNvSpPr>
+            <a:spLocks noGrp="1" noRot="1" noChangeAspect="1"/>
+          </p:cNvSpPr>
+          <p:nvPr>
+            <p:ph type="sldImg"/>
+          </p:nvPr>
+        </p:nvSpPr>
+        <p:spPr/>
+      </p:sp>
+      <p:sp>
+        <p:nvSpPr>
+          <p:cNvPr id="3" name="Notes Placeholder 2">
+            <a:extLst>
+              <a:ext uri="{FF2B5EF4-FFF2-40B4-BE49-F238E27FC236}">
+                <a16:creationId xmlns:a16="http://schemas.microsoft.com/office/drawing/2014/main" id="{BDDD8604-AC27-B211-5E50-6F89F9D784C2}"/>
+              </a:ext>
+            </a:extLst>
+          </p:cNvPr>
+          <p:cNvSpPr>
+            <a:spLocks noGrp="1"/>
+          </p:cNvSpPr>
+          <p:nvPr>
+            <p:ph type="body" idx="1"/>
+          </p:nvPr>
+        </p:nvSpPr>
+        <p:spPr/>
+        <p:txBody>
+          <a:bodyPr/>
+          <a:lstStyle/>
+          <a:p>
+            <a:endParaRPr lang="en-US"/>
+          </a:p>
+        </p:txBody>
+      </p:sp>
+      <p:sp>
+        <p:nvSpPr>
+          <p:cNvPr id="4" name="Slide Number Placeholder 3">
+            <a:extLst>
+              <a:ext uri="{FF2B5EF4-FFF2-40B4-BE49-F238E27FC236}">
+                <a16:creationId xmlns:a16="http://schemas.microsoft.com/office/drawing/2014/main" id="{D00C6C50-AEBD-0F88-4568-029A83042561}"/>
+              </a:ext>
+            </a:extLst>
+          </p:cNvPr>
+          <p:cNvSpPr>
+            <a:spLocks noGrp="1"/>
+          </p:cNvSpPr>
+          <p:nvPr>
+            <p:ph type="sldNum" sz="quarter" idx="5"/>
+          </p:nvPr>
+        </p:nvSpPr>
+        <p:spPr/>
+        <p:txBody>
+          <a:bodyPr/>
+          <a:lstStyle/>
+          <a:p>
+            <a:fld id="{4D8A794E-8D33-1A42-A949-5F1CC9046FB7}" type="slidenum">
+              <a:rPr lang="en-US" smtClean="0"/>
+              <a:t>12</a:t>
+            </a:fld>
+            <a:endParaRPr lang="en-US"/>
+          </a:p>
+        </p:txBody>
+      </p:sp>
+    </p:spTree>
+    <p:extLst>
+      <p:ext uri="{BB962C8B-B14F-4D97-AF65-F5344CB8AC3E}">
+        <p14:creationId xmlns:p14="http://schemas.microsoft.com/office/powerpoint/2010/main" val="1527658061"/>
+      </p:ext>
+    </p:extLst>
+  </p:cSld>
+  <p:clrMapOvr>
+    <a:masterClrMapping/>
+  </p:clrMapOvr>
+</p:notes>
+</file>
+
+<file path=ppt/notesSlides/notesSlide13.xml><?xml version="1.0" encoding="utf-8"?>
+<p:notes xmlns:a="http://schemas.openxmlformats.org/drawingml/2006/main" xmlns:r="http://schemas.openxmlformats.org/officeDocument/2006/relationships" xmlns:p="http://schemas.openxmlformats.org/presentationml/2006/main">
+  <p:cSld>
+    <p:spTree>
+      <p:nvGrpSpPr>
+        <p:cNvPr id="1" name="">
+          <a:extLst>
+            <a:ext uri="{FF2B5EF4-FFF2-40B4-BE49-F238E27FC236}">
+              <a16:creationId xmlns:a16="http://schemas.microsoft.com/office/drawing/2014/main" id="{A4875207-6251-15B8-1771-4BA786A1A233}"/>
+            </a:ext>
+          </a:extLst>
+        </p:cNvPr>
+        <p:cNvGrpSpPr/>
+        <p:nvPr/>
+      </p:nvGrpSpPr>
+      <p:grpSpPr>
+        <a:xfrm>
+          <a:off x="0" y="0"/>
+          <a:ext cx="0" cy="0"/>
+          <a:chOff x="0" y="0"/>
+          <a:chExt cx="0" cy="0"/>
+        </a:xfrm>
+      </p:grpSpPr>
+      <p:sp>
+        <p:nvSpPr>
+          <p:cNvPr id="2" name="Slide Image Placeholder 1">
+            <a:extLst>
+              <a:ext uri="{FF2B5EF4-FFF2-40B4-BE49-F238E27FC236}">
+                <a16:creationId xmlns:a16="http://schemas.microsoft.com/office/drawing/2014/main" id="{9B383F88-0791-2F3B-A770-20D7AED778DB}"/>
+              </a:ext>
+            </a:extLst>
+          </p:cNvPr>
+          <p:cNvSpPr>
+            <a:spLocks noGrp="1" noRot="1" noChangeAspect="1"/>
+          </p:cNvSpPr>
+          <p:nvPr>
+            <p:ph type="sldImg"/>
+          </p:nvPr>
+        </p:nvSpPr>
+        <p:spPr/>
+      </p:sp>
+      <p:sp>
+        <p:nvSpPr>
+          <p:cNvPr id="3" name="Notes Placeholder 2">
+            <a:extLst>
+              <a:ext uri="{FF2B5EF4-FFF2-40B4-BE49-F238E27FC236}">
+                <a16:creationId xmlns:a16="http://schemas.microsoft.com/office/drawing/2014/main" id="{2DAE724B-1914-F463-B1C3-4CEE52AC9E43}"/>
+              </a:ext>
+            </a:extLst>
+          </p:cNvPr>
+          <p:cNvSpPr>
+            <a:spLocks noGrp="1"/>
+          </p:cNvSpPr>
+          <p:nvPr>
+            <p:ph type="body" idx="1"/>
+          </p:nvPr>
+        </p:nvSpPr>
+        <p:spPr/>
+        <p:txBody>
+          <a:bodyPr/>
+          <a:lstStyle/>
+          <a:p>
+            <a:endParaRPr lang="en-US"/>
+          </a:p>
+        </p:txBody>
+      </p:sp>
+      <p:sp>
+        <p:nvSpPr>
+          <p:cNvPr id="4" name="Slide Number Placeholder 3">
+            <a:extLst>
+              <a:ext uri="{FF2B5EF4-FFF2-40B4-BE49-F238E27FC236}">
+                <a16:creationId xmlns:a16="http://schemas.microsoft.com/office/drawing/2014/main" id="{3FE8CE28-97FF-1370-C0EB-6377586016EF}"/>
+              </a:ext>
+            </a:extLst>
+          </p:cNvPr>
+          <p:cNvSpPr>
+            <a:spLocks noGrp="1"/>
+          </p:cNvSpPr>
+          <p:nvPr>
+            <p:ph type="sldNum" sz="quarter" idx="5"/>
+          </p:nvPr>
+        </p:nvSpPr>
+        <p:spPr/>
+        <p:txBody>
+          <a:bodyPr/>
+          <a:lstStyle/>
+          <a:p>
+            <a:fld id="{4D8A794E-8D33-1A42-A949-5F1CC9046FB7}" type="slidenum">
+              <a:rPr lang="en-US" smtClean="0"/>
+              <a:t>13</a:t>
+            </a:fld>
+            <a:endParaRPr lang="en-US"/>
+          </a:p>
+        </p:txBody>
+      </p:sp>
+    </p:spTree>
+    <p:extLst>
+      <p:ext uri="{BB962C8B-B14F-4D97-AF65-F5344CB8AC3E}">
+        <p14:creationId xmlns:p14="http://schemas.microsoft.com/office/powerpoint/2010/main" val="2885933787"/>
+      </p:ext>
+    </p:extLst>
+  </p:cSld>
+  <p:clrMapOvr>
+    <a:masterClrMapping/>
+  </p:clrMapOvr>
+</p:notes>
+</file>
+
+<file path=ppt/notesSlides/notesSlide14.xml><?xml version="1.0" encoding="utf-8"?>
+<p:notes xmlns:a="http://schemas.openxmlformats.org/drawingml/2006/main" xmlns:r="http://schemas.openxmlformats.org/officeDocument/2006/relationships" xmlns:p="http://schemas.openxmlformats.org/presentationml/2006/main">
+  <p:cSld>
+    <p:spTree>
+      <p:nvGrpSpPr>
+        <p:cNvPr id="1" name="">
+          <a:extLst>
+            <a:ext uri="{FF2B5EF4-FFF2-40B4-BE49-F238E27FC236}">
+              <a16:creationId xmlns:a16="http://schemas.microsoft.com/office/drawing/2014/main" id="{6CC32322-13F4-AC83-024F-F915FD9E9328}"/>
+            </a:ext>
+          </a:extLst>
+        </p:cNvPr>
+        <p:cNvGrpSpPr/>
+        <p:nvPr/>
+      </p:nvGrpSpPr>
+      <p:grpSpPr>
+        <a:xfrm>
+          <a:off x="0" y="0"/>
+          <a:ext cx="0" cy="0"/>
+          <a:chOff x="0" y="0"/>
+          <a:chExt cx="0" cy="0"/>
+        </a:xfrm>
+      </p:grpSpPr>
+      <p:sp>
+        <p:nvSpPr>
+          <p:cNvPr id="2" name="Slide Image Placeholder 1">
+            <a:extLst>
+              <a:ext uri="{FF2B5EF4-FFF2-40B4-BE49-F238E27FC236}">
+                <a16:creationId xmlns:a16="http://schemas.microsoft.com/office/drawing/2014/main" id="{B6A541E2-8290-6D28-B120-9E02880C368E}"/>
+              </a:ext>
+            </a:extLst>
+          </p:cNvPr>
+          <p:cNvSpPr>
+            <a:spLocks noGrp="1" noRot="1" noChangeAspect="1"/>
+          </p:cNvSpPr>
+          <p:nvPr>
+            <p:ph type="sldImg"/>
+          </p:nvPr>
+        </p:nvSpPr>
+        <p:spPr/>
+      </p:sp>
+      <p:sp>
+        <p:nvSpPr>
+          <p:cNvPr id="3" name="Notes Placeholder 2">
+            <a:extLst>
+              <a:ext uri="{FF2B5EF4-FFF2-40B4-BE49-F238E27FC236}">
+                <a16:creationId xmlns:a16="http://schemas.microsoft.com/office/drawing/2014/main" id="{7ECA45B6-0E1E-0B11-70C6-D812C7D795F1}"/>
+              </a:ext>
+            </a:extLst>
+          </p:cNvPr>
+          <p:cNvSpPr>
+            <a:spLocks noGrp="1"/>
+          </p:cNvSpPr>
+          <p:nvPr>
+            <p:ph type="body" idx="1"/>
+          </p:nvPr>
+        </p:nvSpPr>
+        <p:spPr/>
+        <p:txBody>
+          <a:bodyPr/>
+          <a:lstStyle/>
+          <a:p>
+            <a:endParaRPr lang="en-US"/>
+          </a:p>
+        </p:txBody>
+      </p:sp>
+      <p:sp>
+        <p:nvSpPr>
+          <p:cNvPr id="4" name="Slide Number Placeholder 3">
+            <a:extLst>
+              <a:ext uri="{FF2B5EF4-FFF2-40B4-BE49-F238E27FC236}">
+                <a16:creationId xmlns:a16="http://schemas.microsoft.com/office/drawing/2014/main" id="{D8D7B952-5B6E-640B-1543-7D442D029193}"/>
+              </a:ext>
+            </a:extLst>
+          </p:cNvPr>
+          <p:cNvSpPr>
+            <a:spLocks noGrp="1"/>
+          </p:cNvSpPr>
+          <p:nvPr>
+            <p:ph type="sldNum" sz="quarter" idx="5"/>
+          </p:nvPr>
+        </p:nvSpPr>
+        <p:spPr/>
+        <p:txBody>
+          <a:bodyPr/>
+          <a:lstStyle/>
+          <a:p>
+            <a:fld id="{4D8A794E-8D33-1A42-A949-5F1CC9046FB7}" type="slidenum">
+              <a:rPr lang="en-US" smtClean="0"/>
+              <a:t>14</a:t>
+            </a:fld>
+            <a:endParaRPr lang="en-US"/>
+          </a:p>
+        </p:txBody>
+      </p:sp>
+    </p:spTree>
+    <p:extLst>
+      <p:ext uri="{BB962C8B-B14F-4D97-AF65-F5344CB8AC3E}">
+        <p14:creationId xmlns:p14="http://schemas.microsoft.com/office/powerpoint/2010/main" val="726296600"/>
+      </p:ext>
+    </p:extLst>
+  </p:cSld>
+  <p:clrMapOvr>
+    <a:masterClrMapping/>
+  </p:clrMapOvr>
+</p:notes>
+</file>
+
+<file path=ppt/notesSlides/notesSlide2.xml><?xml version="1.0" encoding="utf-8"?>
+<p:notes xmlns:a="http://schemas.openxmlformats.org/drawingml/2006/main" xmlns:r="http://schemas.openxmlformats.org/officeDocument/2006/relationships" xmlns:p="http://schemas.openxmlformats.org/presentationml/2006/main">
+  <p:cSld>
+    <p:spTree>
+      <p:nvGrpSpPr>
+        <p:cNvPr id="1" name=""/>
+        <p:cNvGrpSpPr/>
+        <p:nvPr/>
+      </p:nvGrpSpPr>
+      <p:grpSpPr>
+        <a:xfrm>
+          <a:off x="0" y="0"/>
+          <a:ext cx="0" cy="0"/>
+          <a:chOff x="0" y="0"/>
+          <a:chExt cx="0" cy="0"/>
+        </a:xfrm>
+      </p:grpSpPr>
+      <p:sp>
+        <p:nvSpPr>
+          <p:cNvPr id="2" name="Slide Image Placeholder 1"/>
+          <p:cNvSpPr>
+            <a:spLocks noGrp="1" noRot="1" noChangeAspect="1"/>
+          </p:cNvSpPr>
+          <p:nvPr>
+            <p:ph type="sldImg"/>
+          </p:nvPr>
+        </p:nvSpPr>
+        <p:spPr/>
+      </p:sp>
+      <p:sp>
+        <p:nvSpPr>
+          <p:cNvPr id="3" name="Notes Placeholder 2"/>
+          <p:cNvSpPr>
+            <a:spLocks noGrp="1"/>
+          </p:cNvSpPr>
+          <p:nvPr>
+            <p:ph type="body" idx="1"/>
+          </p:nvPr>
+        </p:nvSpPr>
+        <p:spPr/>
+        <p:txBody>
+          <a:bodyPr/>
+          <a:lstStyle/>
+          <a:p>
+            <a:endParaRPr lang="en-US"/>
+          </a:p>
+        </p:txBody>
+      </p:sp>
+      <p:sp>
+        <p:nvSpPr>
+          <p:cNvPr id="4" name="Slide Number Placeholder 3"/>
+          <p:cNvSpPr>
+            <a:spLocks noGrp="1"/>
+          </p:cNvSpPr>
+          <p:nvPr>
+            <p:ph type="sldNum" sz="quarter" idx="5"/>
+          </p:nvPr>
+        </p:nvSpPr>
+        <p:spPr/>
+        <p:txBody>
+          <a:bodyPr/>
+          <a:lstStyle/>
+          <a:p>
+            <a:fld id="{4D8A794E-8D33-1A42-A949-5F1CC9046FB7}" type="slidenum">
+              <a:rPr lang="en-US" smtClean="0"/>
               <a:t>2</a:t>
             </a:fld>
             <a:endParaRPr lang="en-US"/>
@@ -603,7 +1423,7 @@
 </p:notes>
 </file>
 
-<file path=ppt/notesSlides/notesSlide2.xml><?xml version="1.0" encoding="utf-8"?>
+<file path=ppt/notesSlides/notesSlide3.xml><?xml version="1.0" encoding="utf-8"?>
 <p:notes xmlns:a="http://schemas.openxmlformats.org/drawingml/2006/main" xmlns:r="http://schemas.openxmlformats.org/officeDocument/2006/relationships" xmlns:p="http://schemas.openxmlformats.org/presentationml/2006/main">
   <p:cSld>
     <p:spTree>
@@ -665,7 +1485,7 @@
           <a:bodyPr/>
           <a:lstStyle/>
           <a:p>
-            <a:endParaRPr lang="en-US" dirty="0"/>
+            <a:endParaRPr lang="en-US"/>
           </a:p>
         </p:txBody>
       </p:sp>
@@ -711,7 +1531,7 @@
 </p:notes>
 </file>
 
-<file path=ppt/notesSlides/notesSlide3.xml><?xml version="1.0" encoding="utf-8"?>
+<file path=ppt/notesSlides/notesSlide4.xml><?xml version="1.0" encoding="utf-8"?>
 <p:notes xmlns:a="http://schemas.openxmlformats.org/drawingml/2006/main" xmlns:r="http://schemas.openxmlformats.org/officeDocument/2006/relationships" xmlns:p="http://schemas.openxmlformats.org/presentationml/2006/main">
   <p:cSld>
     <p:spTree>
@@ -773,7 +1593,7 @@
           <a:bodyPr/>
           <a:lstStyle/>
           <a:p>
-            <a:endParaRPr lang="en-US" dirty="0"/>
+            <a:endParaRPr lang="en-US"/>
           </a:p>
         </p:txBody>
       </p:sp>
@@ -819,7 +1639,7 @@
 </p:notes>
 </file>
 
-<file path=ppt/notesSlides/notesSlide4.xml><?xml version="1.0" encoding="utf-8"?>
+<file path=ppt/notesSlides/notesSlide5.xml><?xml version="1.0" encoding="utf-8"?>
 <p:notes xmlns:a="http://schemas.openxmlformats.org/drawingml/2006/main" xmlns:r="http://schemas.openxmlformats.org/officeDocument/2006/relationships" xmlns:p="http://schemas.openxmlformats.org/presentationml/2006/main">
   <p:cSld>
     <p:spTree>
@@ -881,7 +1701,7 @@
           <a:bodyPr/>
           <a:lstStyle/>
           <a:p>
-            <a:endParaRPr lang="en-US" dirty="0"/>
+            <a:endParaRPr lang="en-US"/>
           </a:p>
         </p:txBody>
       </p:sp>
@@ -927,7 +1747,7 @@
 </p:notes>
 </file>
 
-<file path=ppt/notesSlides/notesSlide5.xml><?xml version="1.0" encoding="utf-8"?>
+<file path=ppt/notesSlides/notesSlide6.xml><?xml version="1.0" encoding="utf-8"?>
 <p:notes xmlns:a="http://schemas.openxmlformats.org/drawingml/2006/main" xmlns:r="http://schemas.openxmlformats.org/officeDocument/2006/relationships" xmlns:p="http://schemas.openxmlformats.org/presentationml/2006/main">
   <p:cSld>
     <p:spTree>
@@ -989,7 +1809,7 @@
           <a:bodyPr/>
           <a:lstStyle/>
           <a:p>
-            <a:endParaRPr lang="en-US" dirty="0"/>
+            <a:endParaRPr lang="en-US"/>
           </a:p>
         </p:txBody>
       </p:sp>
@@ -1035,7 +1855,7 @@
 </p:notes>
 </file>
 
-<file path=ppt/notesSlides/notesSlide6.xml><?xml version="1.0" encoding="utf-8"?>
+<file path=ppt/notesSlides/notesSlide7.xml><?xml version="1.0" encoding="utf-8"?>
 <p:notes xmlns:a="http://schemas.openxmlformats.org/drawingml/2006/main" xmlns:r="http://schemas.openxmlformats.org/officeDocument/2006/relationships" xmlns:p="http://schemas.openxmlformats.org/presentationml/2006/main">
   <p:cSld>
     <p:spTree>
@@ -1097,7 +1917,7 @@
           <a:bodyPr/>
           <a:lstStyle/>
           <a:p>
-            <a:endParaRPr lang="en-US" dirty="0"/>
+            <a:endParaRPr lang="en-US"/>
           </a:p>
         </p:txBody>
       </p:sp>
@@ -1143,7 +1963,7 @@
 </p:notes>
 </file>
 
-<file path=ppt/notesSlides/notesSlide7.xml><?xml version="1.0" encoding="utf-8"?>
+<file path=ppt/notesSlides/notesSlide8.xml><?xml version="1.0" encoding="utf-8"?>
 <p:notes xmlns:a="http://schemas.openxmlformats.org/drawingml/2006/main" xmlns:r="http://schemas.openxmlformats.org/officeDocument/2006/relationships" xmlns:p="http://schemas.openxmlformats.org/presentationml/2006/main">
   <p:cSld>
     <p:spTree>
@@ -1205,7 +2025,7 @@
           <a:bodyPr/>
           <a:lstStyle/>
           <a:p>
-            <a:endParaRPr lang="en-US" dirty="0"/>
+            <a:endParaRPr lang="en-US"/>
           </a:p>
         </p:txBody>
       </p:sp>
@@ -1251,7 +2071,7 @@
 </p:notes>
 </file>
 
-<file path=ppt/notesSlides/notesSlide8.xml><?xml version="1.0" encoding="utf-8"?>
+<file path=ppt/notesSlides/notesSlide9.xml><?xml version="1.0" encoding="utf-8"?>
 <p:notes xmlns:a="http://schemas.openxmlformats.org/drawingml/2006/main" xmlns:r="http://schemas.openxmlformats.org/officeDocument/2006/relationships" xmlns:p="http://schemas.openxmlformats.org/presentationml/2006/main">
   <p:cSld>
     <p:spTree>
@@ -1259,7 +2079,7 @@
         <p:cNvPr id="1" name="">
           <a:extLst>
             <a:ext uri="{FF2B5EF4-FFF2-40B4-BE49-F238E27FC236}">
-              <a16:creationId xmlns:a16="http://schemas.microsoft.com/office/drawing/2014/main" id="{29B795F7-5D0A-5AE0-3670-FF03958601D5}"/>
+              <a16:creationId xmlns:a16="http://schemas.microsoft.com/office/drawing/2014/main" id="{2F61AE00-7526-42DE-6FF1-8FE0081ABEA5}"/>
             </a:ext>
           </a:extLst>
         </p:cNvPr>
@@ -1279,7 +2099,7 @@
           <p:cNvPr id="2" name="Slide Image Placeholder 1">
             <a:extLst>
               <a:ext uri="{FF2B5EF4-FFF2-40B4-BE49-F238E27FC236}">
-                <a16:creationId xmlns:a16="http://schemas.microsoft.com/office/drawing/2014/main" id="{76EFA9DD-0045-7682-ECF8-F675920758FF}"/>
+                <a16:creationId xmlns:a16="http://schemas.microsoft.com/office/drawing/2014/main" id="{9E0285F9-5634-2B2A-470B-6D0C8AE83EE2}"/>
               </a:ext>
             </a:extLst>
           </p:cNvPr>
@@ -1297,7 +2117,7 @@
           <p:cNvPr id="3" name="Notes Placeholder 2">
             <a:extLst>
               <a:ext uri="{FF2B5EF4-FFF2-40B4-BE49-F238E27FC236}">
-                <a16:creationId xmlns:a16="http://schemas.microsoft.com/office/drawing/2014/main" id="{2BDF0B36-1631-EE5A-6DC7-A9BF220D1D04}"/>
+                <a16:creationId xmlns:a16="http://schemas.microsoft.com/office/drawing/2014/main" id="{397A2A2D-ACE6-259A-30CA-98A4BB2B8735}"/>
               </a:ext>
             </a:extLst>
           </p:cNvPr>
@@ -1313,7 +2133,7 @@
           <a:bodyPr/>
           <a:lstStyle/>
           <a:p>
-            <a:endParaRPr lang="en-US" dirty="0"/>
+            <a:endParaRPr lang="en-US"/>
           </a:p>
         </p:txBody>
       </p:sp>
@@ -1322,7 +2142,7 @@
           <p:cNvPr id="4" name="Slide Number Placeholder 3">
             <a:extLst>
               <a:ext uri="{FF2B5EF4-FFF2-40B4-BE49-F238E27FC236}">
-                <a16:creationId xmlns:a16="http://schemas.microsoft.com/office/drawing/2014/main" id="{FB8AD123-5842-81FA-9EED-14A7D3FBDC47}"/>
+                <a16:creationId xmlns:a16="http://schemas.microsoft.com/office/drawing/2014/main" id="{68CF91BB-3FF9-8DCE-7923-C8D3F4B683BB}"/>
               </a:ext>
             </a:extLst>
           </p:cNvPr>
@@ -1349,7 +2169,7 @@
     </p:spTree>
     <p:extLst>
       <p:ext uri="{BB962C8B-B14F-4D97-AF65-F5344CB8AC3E}">
-        <p14:creationId xmlns:p14="http://schemas.microsoft.com/office/powerpoint/2010/main" val="1911247430"/>
+        <p14:creationId xmlns:p14="http://schemas.microsoft.com/office/powerpoint/2010/main" val="3303024445"/>
       </p:ext>
     </p:extLst>
   </p:cSld>
@@ -1986,7 +2806,7 @@
           <a:p>
             <a:pPr algn="ctr"/>
             <a:r>
-              <a:rPr lang="en-US" sz="6000" dirty="0">
+              <a:rPr lang="en-US" sz="6000">
                 <a:solidFill>
                   <a:schemeClr val="bg1"/>
                 </a:solidFill>
@@ -2026,14 +2846,14 @@
           </a:ln>
           <a:extLst>
             <a:ext uri="{909E8E84-426E-40dd-AFC4-6F175D3DCCD1}">
-              <a14:hiddenFill xmlns="" xmlns:a14="http://schemas.microsoft.com/office/drawing/2010/main">
+              <a14:hiddenFill xmlns:a14="http://schemas.microsoft.com/office/drawing/2010/main" xmlns="">
                 <a:solidFill>
                   <a:srgbClr val="FFFFFF"/>
                 </a:solidFill>
               </a14:hiddenFill>
             </a:ext>
             <a:ext uri="{91240B29-F687-4f45-9708-019B960494DF}">
-              <a14:hiddenLine xmlns="" xmlns:a14="http://schemas.microsoft.com/office/drawing/2010/main" w="9525">
+              <a14:hiddenLine xmlns:a14="http://schemas.microsoft.com/office/drawing/2010/main" xmlns="" w="9525">
                 <a:solidFill>
                   <a:srgbClr val="000000"/>
                 </a:solidFill>
@@ -2161,7 +2981,7 @@
               </a:spcBef>
             </a:pPr>
             <a:r>
-              <a:rPr lang="en-US" sz="4000" dirty="0">
+              <a:rPr lang="en-US" sz="4000">
                 <a:solidFill>
                   <a:schemeClr val="bg1"/>
                 </a:solidFill>
@@ -2174,10 +2994,2012 @@
           </a:p>
         </p:txBody>
       </p:sp>
+      <p:sp>
+        <p:nvSpPr>
+          <p:cNvPr id="6" name="TextBox 5">
+            <a:extLst>
+              <a:ext uri="{FF2B5EF4-FFF2-40B4-BE49-F238E27FC236}">
+                <a16:creationId xmlns:a16="http://schemas.microsoft.com/office/drawing/2014/main" id="{BA5EEEA9-6B1D-3C46-0E53-5E26701B0C72}"/>
+              </a:ext>
+            </a:extLst>
+          </p:cNvPr>
+          <p:cNvSpPr txBox="1"/>
+          <p:nvPr/>
+        </p:nvSpPr>
+        <p:spPr>
+          <a:xfrm>
+            <a:off x="5158539" y="3771421"/>
+            <a:ext cx="1874921" cy="871970"/>
+          </a:xfrm>
+          <a:prstGeom prst="rect">
+            <a:avLst/>
+          </a:prstGeom>
+          <a:noFill/>
+        </p:spPr>
+        <p:txBody>
+          <a:bodyPr wrap="square">
+            <a:spAutoFit/>
+          </a:bodyPr>
+          <a:lstStyle/>
+          <a:p>
+            <a:pPr algn="ctr">
+              <a:lnSpc>
+                <a:spcPct val="150000"/>
+              </a:lnSpc>
+            </a:pPr>
+            <a:r>
+              <a:rPr lang="en-US" dirty="0">
+                <a:solidFill>
+                  <a:schemeClr val="bg1"/>
+                </a:solidFill>
+              </a:rPr>
+              <a:t>Matthew Hays</a:t>
+            </a:r>
+          </a:p>
+          <a:p>
+            <a:pPr algn="ctr">
+              <a:lnSpc>
+                <a:spcPct val="150000"/>
+              </a:lnSpc>
+            </a:pPr>
+            <a:r>
+              <a:rPr lang="en-US" dirty="0">
+                <a:solidFill>
+                  <a:schemeClr val="bg1"/>
+                </a:solidFill>
+              </a:rPr>
+              <a:t>Joshua Wellman</a:t>
+            </a:r>
+          </a:p>
+        </p:txBody>
+      </p:sp>
     </p:spTree>
     <p:extLst>
       <p:ext uri="{BB962C8B-B14F-4D97-AF65-F5344CB8AC3E}">
         <p14:creationId xmlns:p14="http://schemas.microsoft.com/office/powerpoint/2010/main" val="3776999064"/>
+      </p:ext>
+    </p:extLst>
+  </p:cSld>
+  <p:clrMapOvr>
+    <a:masterClrMapping/>
+  </p:clrMapOvr>
+</p:sld>
+</file>
+
+<file path=ppt/slides/slide10.xml><?xml version="1.0" encoding="utf-8"?>
+<p:sld xmlns:a="http://schemas.openxmlformats.org/drawingml/2006/main" xmlns:r="http://schemas.openxmlformats.org/officeDocument/2006/relationships" xmlns:p="http://schemas.openxmlformats.org/presentationml/2006/main">
+  <p:cSld>
+    <p:spTree>
+      <p:nvGrpSpPr>
+        <p:cNvPr id="1" name="">
+          <a:extLst>
+            <a:ext uri="{FF2B5EF4-FFF2-40B4-BE49-F238E27FC236}">
+              <a16:creationId xmlns:a16="http://schemas.microsoft.com/office/drawing/2014/main" id="{2047E3A7-91B3-2402-69B1-14E578C5DC2E}"/>
+            </a:ext>
+          </a:extLst>
+        </p:cNvPr>
+        <p:cNvGrpSpPr/>
+        <p:nvPr/>
+      </p:nvGrpSpPr>
+      <p:grpSpPr>
+        <a:xfrm>
+          <a:off x="0" y="0"/>
+          <a:ext cx="0" cy="0"/>
+          <a:chOff x="0" y="0"/>
+          <a:chExt cx="0" cy="0"/>
+        </a:xfrm>
+      </p:grpSpPr>
+      <p:sp>
+        <p:nvSpPr>
+          <p:cNvPr id="2" name="Title 1">
+            <a:extLst>
+              <a:ext uri="{FF2B5EF4-FFF2-40B4-BE49-F238E27FC236}">
+                <a16:creationId xmlns:a16="http://schemas.microsoft.com/office/drawing/2014/main" id="{BBF13E05-D8DC-7543-6877-4B17AB95FDB0}"/>
+              </a:ext>
+            </a:extLst>
+          </p:cNvPr>
+          <p:cNvSpPr txBox="1">
+            <a:spLocks/>
+          </p:cNvSpPr>
+          <p:nvPr/>
+        </p:nvSpPr>
+        <p:spPr>
+          <a:xfrm>
+            <a:off x="3552429" y="696942"/>
+            <a:ext cx="7205686" cy="677405"/>
+          </a:xfrm>
+          <a:prstGeom prst="rect">
+            <a:avLst/>
+          </a:prstGeom>
+        </p:spPr>
+        <p:txBody>
+          <a:bodyPr lIns="91440" tIns="45720" rIns="91440" bIns="45720" anchor="t"/>
+          <a:lstStyle>
+            <a:lvl1pPr algn="l" defTabSz="914400" rtl="0" eaLnBrk="1" latinLnBrk="0" hangingPunct="1">
+              <a:lnSpc>
+                <a:spcPct val="90000"/>
+              </a:lnSpc>
+              <a:spcBef>
+                <a:spcPct val="0"/>
+              </a:spcBef>
+              <a:buNone/>
+              <a:defRPr sz="4400" kern="1200">
+                <a:solidFill>
+                  <a:schemeClr val="tx1"/>
+                </a:solidFill>
+                <a:latin typeface="+mj-lt"/>
+                <a:ea typeface="+mj-ea"/>
+                <a:cs typeface="+mj-cs"/>
+              </a:defRPr>
+            </a:lvl1pPr>
+          </a:lstStyle>
+          <a:p>
+            <a:r>
+              <a:rPr lang="en-US" altLang="en-US" b="1">
+                <a:solidFill>
+                  <a:srgbClr val="1E482A"/>
+                </a:solidFill>
+                <a:latin typeface="Calibri"/>
+                <a:ea typeface="Calibri"/>
+                <a:cs typeface="Calibri"/>
+              </a:rPr>
+              <a:t>Deployment Diagram</a:t>
+            </a:r>
+            <a:endParaRPr lang="en-US"/>
+          </a:p>
+        </p:txBody>
+      </p:sp>
+      <p:sp>
+        <p:nvSpPr>
+          <p:cNvPr id="3" name="Content Placeholder 2">
+            <a:extLst>
+              <a:ext uri="{FF2B5EF4-FFF2-40B4-BE49-F238E27FC236}">
+                <a16:creationId xmlns:a16="http://schemas.microsoft.com/office/drawing/2014/main" id="{2CBD9534-D256-3E20-43DB-936762CD698C}"/>
+              </a:ext>
+            </a:extLst>
+          </p:cNvPr>
+          <p:cNvSpPr txBox="1">
+            <a:spLocks/>
+          </p:cNvSpPr>
+          <p:nvPr/>
+        </p:nvSpPr>
+        <p:spPr>
+          <a:xfrm>
+            <a:off x="3552428" y="1506551"/>
+            <a:ext cx="7205685" cy="3844897"/>
+          </a:xfrm>
+          <a:prstGeom prst="rect">
+            <a:avLst/>
+          </a:prstGeom>
+        </p:spPr>
+        <p:txBody>
+          <a:bodyPr/>
+          <a:lstStyle>
+            <a:lvl1pPr marL="228600" indent="-228600" algn="l" defTabSz="914400" rtl="0" eaLnBrk="1" latinLnBrk="0" hangingPunct="1">
+              <a:lnSpc>
+                <a:spcPct val="90000"/>
+              </a:lnSpc>
+              <a:spcBef>
+                <a:spcPts val="1000"/>
+              </a:spcBef>
+              <a:buFont typeface="Arial"/>
+              <a:buChar char="•"/>
+              <a:defRPr sz="2800" kern="1200">
+                <a:solidFill>
+                  <a:schemeClr val="tx1"/>
+                </a:solidFill>
+                <a:latin typeface="+mn-lt"/>
+                <a:ea typeface="+mn-ea"/>
+                <a:cs typeface="+mn-cs"/>
+              </a:defRPr>
+            </a:lvl1pPr>
+            <a:lvl2pPr marL="685800" indent="-228600" algn="l" defTabSz="914400" rtl="0" eaLnBrk="1" latinLnBrk="0" hangingPunct="1">
+              <a:lnSpc>
+                <a:spcPct val="90000"/>
+              </a:lnSpc>
+              <a:spcBef>
+                <a:spcPts val="500"/>
+              </a:spcBef>
+              <a:buFont typeface="Arial"/>
+              <a:buChar char="•"/>
+              <a:defRPr sz="2400" kern="1200">
+                <a:solidFill>
+                  <a:schemeClr val="tx1"/>
+                </a:solidFill>
+                <a:latin typeface="+mn-lt"/>
+                <a:ea typeface="+mn-ea"/>
+                <a:cs typeface="+mn-cs"/>
+              </a:defRPr>
+            </a:lvl2pPr>
+            <a:lvl3pPr marL="1143000" indent="-228600" algn="l" defTabSz="914400" rtl="0" eaLnBrk="1" latinLnBrk="0" hangingPunct="1">
+              <a:lnSpc>
+                <a:spcPct val="90000"/>
+              </a:lnSpc>
+              <a:spcBef>
+                <a:spcPts val="500"/>
+              </a:spcBef>
+              <a:buFont typeface="Arial"/>
+              <a:buChar char="•"/>
+              <a:defRPr sz="2000" kern="1200">
+                <a:solidFill>
+                  <a:schemeClr val="tx1"/>
+                </a:solidFill>
+                <a:latin typeface="+mn-lt"/>
+                <a:ea typeface="+mn-ea"/>
+                <a:cs typeface="+mn-cs"/>
+              </a:defRPr>
+            </a:lvl3pPr>
+            <a:lvl4pPr marL="1600200" indent="-228600" algn="l" defTabSz="914400" rtl="0" eaLnBrk="1" latinLnBrk="0" hangingPunct="1">
+              <a:lnSpc>
+                <a:spcPct val="90000"/>
+              </a:lnSpc>
+              <a:spcBef>
+                <a:spcPts val="500"/>
+              </a:spcBef>
+              <a:buFont typeface="Arial"/>
+              <a:buChar char="•"/>
+              <a:defRPr sz="1800" kern="1200">
+                <a:solidFill>
+                  <a:schemeClr val="tx1"/>
+                </a:solidFill>
+                <a:latin typeface="+mn-lt"/>
+                <a:ea typeface="+mn-ea"/>
+                <a:cs typeface="+mn-cs"/>
+              </a:defRPr>
+            </a:lvl4pPr>
+            <a:lvl5pPr marL="2057400" indent="-228600" algn="l" defTabSz="914400" rtl="0" eaLnBrk="1" latinLnBrk="0" hangingPunct="1">
+              <a:lnSpc>
+                <a:spcPct val="90000"/>
+              </a:lnSpc>
+              <a:spcBef>
+                <a:spcPts val="500"/>
+              </a:spcBef>
+              <a:buFont typeface="Arial"/>
+              <a:buChar char="•"/>
+              <a:defRPr sz="1800" kern="1200">
+                <a:solidFill>
+                  <a:schemeClr val="tx1"/>
+                </a:solidFill>
+                <a:latin typeface="+mn-lt"/>
+                <a:ea typeface="+mn-ea"/>
+                <a:cs typeface="+mn-cs"/>
+              </a:defRPr>
+            </a:lvl5pPr>
+            <a:lvl6pPr marL="2514600" indent="-228600" algn="l" defTabSz="914400" rtl="0" eaLnBrk="1" latinLnBrk="0" hangingPunct="1">
+              <a:lnSpc>
+                <a:spcPct val="90000"/>
+              </a:lnSpc>
+              <a:spcBef>
+                <a:spcPts val="500"/>
+              </a:spcBef>
+              <a:buFont typeface="Arial"/>
+              <a:buChar char="•"/>
+              <a:defRPr sz="1800" kern="1200">
+                <a:solidFill>
+                  <a:schemeClr val="tx1"/>
+                </a:solidFill>
+                <a:latin typeface="+mn-lt"/>
+                <a:ea typeface="+mn-ea"/>
+                <a:cs typeface="+mn-cs"/>
+              </a:defRPr>
+            </a:lvl6pPr>
+            <a:lvl7pPr marL="2971800" indent="-228600" algn="l" defTabSz="914400" rtl="0" eaLnBrk="1" latinLnBrk="0" hangingPunct="1">
+              <a:lnSpc>
+                <a:spcPct val="90000"/>
+              </a:lnSpc>
+              <a:spcBef>
+                <a:spcPts val="500"/>
+              </a:spcBef>
+              <a:buFont typeface="Arial"/>
+              <a:buChar char="•"/>
+              <a:defRPr sz="1800" kern="1200">
+                <a:solidFill>
+                  <a:schemeClr val="tx1"/>
+                </a:solidFill>
+                <a:latin typeface="+mn-lt"/>
+                <a:ea typeface="+mn-ea"/>
+                <a:cs typeface="+mn-cs"/>
+              </a:defRPr>
+            </a:lvl7pPr>
+            <a:lvl8pPr marL="3429000" indent="-228600" algn="l" defTabSz="914400" rtl="0" eaLnBrk="1" latinLnBrk="0" hangingPunct="1">
+              <a:lnSpc>
+                <a:spcPct val="90000"/>
+              </a:lnSpc>
+              <a:spcBef>
+                <a:spcPts val="500"/>
+              </a:spcBef>
+              <a:buFont typeface="Arial"/>
+              <a:buChar char="•"/>
+              <a:defRPr sz="1800" kern="1200">
+                <a:solidFill>
+                  <a:schemeClr val="tx1"/>
+                </a:solidFill>
+                <a:latin typeface="+mn-lt"/>
+                <a:ea typeface="+mn-ea"/>
+                <a:cs typeface="+mn-cs"/>
+              </a:defRPr>
+            </a:lvl8pPr>
+            <a:lvl9pPr marL="3886200" indent="-228600" algn="l" defTabSz="914400" rtl="0" eaLnBrk="1" latinLnBrk="0" hangingPunct="1">
+              <a:lnSpc>
+                <a:spcPct val="90000"/>
+              </a:lnSpc>
+              <a:spcBef>
+                <a:spcPts val="500"/>
+              </a:spcBef>
+              <a:buFont typeface="Arial"/>
+              <a:buChar char="•"/>
+              <a:defRPr sz="1800" kern="1200">
+                <a:solidFill>
+                  <a:schemeClr val="tx1"/>
+                </a:solidFill>
+                <a:latin typeface="+mn-lt"/>
+                <a:ea typeface="+mn-ea"/>
+                <a:cs typeface="+mn-cs"/>
+              </a:defRPr>
+            </a:lvl9pPr>
+          </a:lstStyle>
+          <a:p>
+            <a:pPr lvl="2">
+              <a:lnSpc>
+                <a:spcPct val="100000"/>
+              </a:lnSpc>
+              <a:spcBef>
+                <a:spcPts val="0"/>
+              </a:spcBef>
+            </a:pPr>
+            <a:endParaRPr lang="en-US" altLang="en-US">
+              <a:ea typeface="ＭＳ Ｐゴシック" charset="-128"/>
+            </a:endParaRPr>
+          </a:p>
+        </p:txBody>
+      </p:sp>
+      <p:pic>
+        <p:nvPicPr>
+          <p:cNvPr id="4" name="Picture 3" descr="A diagram of a computer server&#10;&#10;AI-generated content may be incorrect.">
+            <a:extLst>
+              <a:ext uri="{FF2B5EF4-FFF2-40B4-BE49-F238E27FC236}">
+                <a16:creationId xmlns:a16="http://schemas.microsoft.com/office/drawing/2014/main" id="{EC1057BC-A4C0-5A60-44AD-CBA0940E9474}"/>
+              </a:ext>
+            </a:extLst>
+          </p:cNvPr>
+          <p:cNvPicPr>
+            <a:picLocks noChangeAspect="1"/>
+          </p:cNvPicPr>
+          <p:nvPr/>
+        </p:nvPicPr>
+        <p:blipFill>
+          <a:blip r:embed="rId3"/>
+          <a:stretch>
+            <a:fillRect/>
+          </a:stretch>
+        </p:blipFill>
+        <p:spPr>
+          <a:xfrm>
+            <a:off x="2628900" y="1965073"/>
+            <a:ext cx="9048750" cy="3842253"/>
+          </a:xfrm>
+          <a:prstGeom prst="rect">
+            <a:avLst/>
+          </a:prstGeom>
+        </p:spPr>
+      </p:pic>
+    </p:spTree>
+    <p:extLst>
+      <p:ext uri="{BB962C8B-B14F-4D97-AF65-F5344CB8AC3E}">
+        <p14:creationId xmlns:p14="http://schemas.microsoft.com/office/powerpoint/2010/main" val="697341776"/>
+      </p:ext>
+    </p:extLst>
+  </p:cSld>
+  <p:clrMapOvr>
+    <a:masterClrMapping/>
+  </p:clrMapOvr>
+</p:sld>
+</file>
+
+<file path=ppt/slides/slide11.xml><?xml version="1.0" encoding="utf-8"?>
+<p:sld xmlns:a="http://schemas.openxmlformats.org/drawingml/2006/main" xmlns:r="http://schemas.openxmlformats.org/officeDocument/2006/relationships" xmlns:p="http://schemas.openxmlformats.org/presentationml/2006/main">
+  <p:cSld>
+    <p:spTree>
+      <p:nvGrpSpPr>
+        <p:cNvPr id="1" name="">
+          <a:extLst>
+            <a:ext uri="{FF2B5EF4-FFF2-40B4-BE49-F238E27FC236}">
+              <a16:creationId xmlns:a16="http://schemas.microsoft.com/office/drawing/2014/main" id="{F1821901-CC72-2FAE-EF02-6CC728D5E9EC}"/>
+            </a:ext>
+          </a:extLst>
+        </p:cNvPr>
+        <p:cNvGrpSpPr/>
+        <p:nvPr/>
+      </p:nvGrpSpPr>
+      <p:grpSpPr>
+        <a:xfrm>
+          <a:off x="0" y="0"/>
+          <a:ext cx="0" cy="0"/>
+          <a:chOff x="0" y="0"/>
+          <a:chExt cx="0" cy="0"/>
+        </a:xfrm>
+      </p:grpSpPr>
+      <p:sp>
+        <p:nvSpPr>
+          <p:cNvPr id="2" name="Title 1">
+            <a:extLst>
+              <a:ext uri="{FF2B5EF4-FFF2-40B4-BE49-F238E27FC236}">
+                <a16:creationId xmlns:a16="http://schemas.microsoft.com/office/drawing/2014/main" id="{2AE48923-8E0C-6B2D-BF43-2FAB857C83B1}"/>
+              </a:ext>
+            </a:extLst>
+          </p:cNvPr>
+          <p:cNvSpPr txBox="1">
+            <a:spLocks/>
+          </p:cNvSpPr>
+          <p:nvPr/>
+        </p:nvSpPr>
+        <p:spPr>
+          <a:xfrm>
+            <a:off x="3552429" y="696942"/>
+            <a:ext cx="7205686" cy="677405"/>
+          </a:xfrm>
+          <a:prstGeom prst="rect">
+            <a:avLst/>
+          </a:prstGeom>
+        </p:spPr>
+        <p:txBody>
+          <a:bodyPr/>
+          <a:lstStyle>
+            <a:lvl1pPr algn="l" defTabSz="914400" rtl="0" eaLnBrk="1" latinLnBrk="0" hangingPunct="1">
+              <a:lnSpc>
+                <a:spcPct val="90000"/>
+              </a:lnSpc>
+              <a:spcBef>
+                <a:spcPct val="0"/>
+              </a:spcBef>
+              <a:buNone/>
+              <a:defRPr sz="4400" kern="1200">
+                <a:solidFill>
+                  <a:schemeClr val="tx1"/>
+                </a:solidFill>
+                <a:latin typeface="+mj-lt"/>
+                <a:ea typeface="+mj-ea"/>
+                <a:cs typeface="+mj-cs"/>
+              </a:defRPr>
+            </a:lvl1pPr>
+          </a:lstStyle>
+          <a:p>
+            <a:r>
+              <a:rPr lang="en-US" altLang="en-US" b="1">
+                <a:solidFill>
+                  <a:srgbClr val="1E482A"/>
+                </a:solidFill>
+                <a:latin typeface="Calibri" charset="0"/>
+                <a:ea typeface="Calibri" charset="0"/>
+                <a:cs typeface="Calibri" charset="0"/>
+              </a:rPr>
+              <a:t>Running the Application</a:t>
+            </a:r>
+          </a:p>
+        </p:txBody>
+      </p:sp>
+      <p:sp>
+        <p:nvSpPr>
+          <p:cNvPr id="3" name="Content Placeholder 2">
+            <a:extLst>
+              <a:ext uri="{FF2B5EF4-FFF2-40B4-BE49-F238E27FC236}">
+                <a16:creationId xmlns:a16="http://schemas.microsoft.com/office/drawing/2014/main" id="{AC600985-D61C-AE8F-5018-2AF84F631F4A}"/>
+              </a:ext>
+            </a:extLst>
+          </p:cNvPr>
+          <p:cNvSpPr txBox="1">
+            <a:spLocks/>
+          </p:cNvSpPr>
+          <p:nvPr/>
+        </p:nvSpPr>
+        <p:spPr>
+          <a:xfrm>
+            <a:off x="3552428" y="1506551"/>
+            <a:ext cx="7205685" cy="3844897"/>
+          </a:xfrm>
+          <a:prstGeom prst="rect">
+            <a:avLst/>
+          </a:prstGeom>
+        </p:spPr>
+        <p:txBody>
+          <a:bodyPr/>
+          <a:lstStyle>
+            <a:lvl1pPr marL="228600" indent="-228600" algn="l" defTabSz="914400" rtl="0" eaLnBrk="1" latinLnBrk="0" hangingPunct="1">
+              <a:lnSpc>
+                <a:spcPct val="90000"/>
+              </a:lnSpc>
+              <a:spcBef>
+                <a:spcPts val="1000"/>
+              </a:spcBef>
+              <a:buFont typeface="Arial"/>
+              <a:buChar char="•"/>
+              <a:defRPr sz="2800" kern="1200">
+                <a:solidFill>
+                  <a:schemeClr val="tx1"/>
+                </a:solidFill>
+                <a:latin typeface="+mn-lt"/>
+                <a:ea typeface="+mn-ea"/>
+                <a:cs typeface="+mn-cs"/>
+              </a:defRPr>
+            </a:lvl1pPr>
+            <a:lvl2pPr marL="685800" indent="-228600" algn="l" defTabSz="914400" rtl="0" eaLnBrk="1" latinLnBrk="0" hangingPunct="1">
+              <a:lnSpc>
+                <a:spcPct val="90000"/>
+              </a:lnSpc>
+              <a:spcBef>
+                <a:spcPts val="500"/>
+              </a:spcBef>
+              <a:buFont typeface="Arial"/>
+              <a:buChar char="•"/>
+              <a:defRPr sz="2400" kern="1200">
+                <a:solidFill>
+                  <a:schemeClr val="tx1"/>
+                </a:solidFill>
+                <a:latin typeface="+mn-lt"/>
+                <a:ea typeface="+mn-ea"/>
+                <a:cs typeface="+mn-cs"/>
+              </a:defRPr>
+            </a:lvl2pPr>
+            <a:lvl3pPr marL="1143000" indent="-228600" algn="l" defTabSz="914400" rtl="0" eaLnBrk="1" latinLnBrk="0" hangingPunct="1">
+              <a:lnSpc>
+                <a:spcPct val="90000"/>
+              </a:lnSpc>
+              <a:spcBef>
+                <a:spcPts val="500"/>
+              </a:spcBef>
+              <a:buFont typeface="Arial"/>
+              <a:buChar char="•"/>
+              <a:defRPr sz="2000" kern="1200">
+                <a:solidFill>
+                  <a:schemeClr val="tx1"/>
+                </a:solidFill>
+                <a:latin typeface="+mn-lt"/>
+                <a:ea typeface="+mn-ea"/>
+                <a:cs typeface="+mn-cs"/>
+              </a:defRPr>
+            </a:lvl3pPr>
+            <a:lvl4pPr marL="1600200" indent="-228600" algn="l" defTabSz="914400" rtl="0" eaLnBrk="1" latinLnBrk="0" hangingPunct="1">
+              <a:lnSpc>
+                <a:spcPct val="90000"/>
+              </a:lnSpc>
+              <a:spcBef>
+                <a:spcPts val="500"/>
+              </a:spcBef>
+              <a:buFont typeface="Arial"/>
+              <a:buChar char="•"/>
+              <a:defRPr sz="1800" kern="1200">
+                <a:solidFill>
+                  <a:schemeClr val="tx1"/>
+                </a:solidFill>
+                <a:latin typeface="+mn-lt"/>
+                <a:ea typeface="+mn-ea"/>
+                <a:cs typeface="+mn-cs"/>
+              </a:defRPr>
+            </a:lvl4pPr>
+            <a:lvl5pPr marL="2057400" indent="-228600" algn="l" defTabSz="914400" rtl="0" eaLnBrk="1" latinLnBrk="0" hangingPunct="1">
+              <a:lnSpc>
+                <a:spcPct val="90000"/>
+              </a:lnSpc>
+              <a:spcBef>
+                <a:spcPts val="500"/>
+              </a:spcBef>
+              <a:buFont typeface="Arial"/>
+              <a:buChar char="•"/>
+              <a:defRPr sz="1800" kern="1200">
+                <a:solidFill>
+                  <a:schemeClr val="tx1"/>
+                </a:solidFill>
+                <a:latin typeface="+mn-lt"/>
+                <a:ea typeface="+mn-ea"/>
+                <a:cs typeface="+mn-cs"/>
+              </a:defRPr>
+            </a:lvl5pPr>
+            <a:lvl6pPr marL="2514600" indent="-228600" algn="l" defTabSz="914400" rtl="0" eaLnBrk="1" latinLnBrk="0" hangingPunct="1">
+              <a:lnSpc>
+                <a:spcPct val="90000"/>
+              </a:lnSpc>
+              <a:spcBef>
+                <a:spcPts val="500"/>
+              </a:spcBef>
+              <a:buFont typeface="Arial"/>
+              <a:buChar char="•"/>
+              <a:defRPr sz="1800" kern="1200">
+                <a:solidFill>
+                  <a:schemeClr val="tx1"/>
+                </a:solidFill>
+                <a:latin typeface="+mn-lt"/>
+                <a:ea typeface="+mn-ea"/>
+                <a:cs typeface="+mn-cs"/>
+              </a:defRPr>
+            </a:lvl6pPr>
+            <a:lvl7pPr marL="2971800" indent="-228600" algn="l" defTabSz="914400" rtl="0" eaLnBrk="1" latinLnBrk="0" hangingPunct="1">
+              <a:lnSpc>
+                <a:spcPct val="90000"/>
+              </a:lnSpc>
+              <a:spcBef>
+                <a:spcPts val="500"/>
+              </a:spcBef>
+              <a:buFont typeface="Arial"/>
+              <a:buChar char="•"/>
+              <a:defRPr sz="1800" kern="1200">
+                <a:solidFill>
+                  <a:schemeClr val="tx1"/>
+                </a:solidFill>
+                <a:latin typeface="+mn-lt"/>
+                <a:ea typeface="+mn-ea"/>
+                <a:cs typeface="+mn-cs"/>
+              </a:defRPr>
+            </a:lvl7pPr>
+            <a:lvl8pPr marL="3429000" indent="-228600" algn="l" defTabSz="914400" rtl="0" eaLnBrk="1" latinLnBrk="0" hangingPunct="1">
+              <a:lnSpc>
+                <a:spcPct val="90000"/>
+              </a:lnSpc>
+              <a:spcBef>
+                <a:spcPts val="500"/>
+              </a:spcBef>
+              <a:buFont typeface="Arial"/>
+              <a:buChar char="•"/>
+              <a:defRPr sz="1800" kern="1200">
+                <a:solidFill>
+                  <a:schemeClr val="tx1"/>
+                </a:solidFill>
+                <a:latin typeface="+mn-lt"/>
+                <a:ea typeface="+mn-ea"/>
+                <a:cs typeface="+mn-cs"/>
+              </a:defRPr>
+            </a:lvl8pPr>
+            <a:lvl9pPr marL="3886200" indent="-228600" algn="l" defTabSz="914400" rtl="0" eaLnBrk="1" latinLnBrk="0" hangingPunct="1">
+              <a:lnSpc>
+                <a:spcPct val="90000"/>
+              </a:lnSpc>
+              <a:spcBef>
+                <a:spcPts val="500"/>
+              </a:spcBef>
+              <a:buFont typeface="Arial"/>
+              <a:buChar char="•"/>
+              <a:defRPr sz="1800" kern="1200">
+                <a:solidFill>
+                  <a:schemeClr val="tx1"/>
+                </a:solidFill>
+                <a:latin typeface="+mn-lt"/>
+                <a:ea typeface="+mn-ea"/>
+                <a:cs typeface="+mn-cs"/>
+              </a:defRPr>
+            </a:lvl9pPr>
+          </a:lstStyle>
+          <a:p>
+            <a:pPr lvl="2">
+              <a:lnSpc>
+                <a:spcPct val="100000"/>
+              </a:lnSpc>
+              <a:spcBef>
+                <a:spcPts val="0"/>
+              </a:spcBef>
+            </a:pPr>
+            <a:endParaRPr lang="en-US" altLang="en-US">
+              <a:ea typeface="ＭＳ Ｐゴシック" charset="-128"/>
+            </a:endParaRPr>
+          </a:p>
+        </p:txBody>
+      </p:sp>
+      <p:pic>
+        <p:nvPicPr>
+          <p:cNvPr id="5" name="Picture 4" descr="A screenshot of a computer&#10;&#10;AI-generated content may be incorrect.">
+            <a:extLst>
+              <a:ext uri="{FF2B5EF4-FFF2-40B4-BE49-F238E27FC236}">
+                <a16:creationId xmlns:a16="http://schemas.microsoft.com/office/drawing/2014/main" id="{7C0BFD20-B9E9-CB3A-0840-8A88A4D37B99}"/>
+              </a:ext>
+            </a:extLst>
+          </p:cNvPr>
+          <p:cNvPicPr>
+            <a:picLocks noChangeAspect="1"/>
+          </p:cNvPicPr>
+          <p:nvPr/>
+        </p:nvPicPr>
+        <p:blipFill>
+          <a:blip r:embed="rId3">
+            <a:extLst>
+              <a:ext uri="{28A0092B-C50C-407E-A947-70E740481C1C}">
+                <a14:useLocalDpi xmlns:a14="http://schemas.microsoft.com/office/drawing/2010/main" val="0"/>
+              </a:ext>
+            </a:extLst>
+          </a:blip>
+          <a:stretch>
+            <a:fillRect/>
+          </a:stretch>
+        </p:blipFill>
+        <p:spPr>
+          <a:xfrm>
+            <a:off x="3287102" y="1374347"/>
+            <a:ext cx="7736336" cy="4594505"/>
+          </a:xfrm>
+          <a:prstGeom prst="rect">
+            <a:avLst/>
+          </a:prstGeom>
+        </p:spPr>
+      </p:pic>
+      <p:sp>
+        <p:nvSpPr>
+          <p:cNvPr id="6" name="TextBox 5">
+            <a:extLst>
+              <a:ext uri="{FF2B5EF4-FFF2-40B4-BE49-F238E27FC236}">
+                <a16:creationId xmlns:a16="http://schemas.microsoft.com/office/drawing/2014/main" id="{8046B08F-622B-9246-4D7B-8C7799A9C2A9}"/>
+              </a:ext>
+            </a:extLst>
+          </p:cNvPr>
+          <p:cNvSpPr txBox="1"/>
+          <p:nvPr/>
+        </p:nvSpPr>
+        <p:spPr>
+          <a:xfrm>
+            <a:off x="3044689" y="6276925"/>
+            <a:ext cx="8708474" cy="369332"/>
+          </a:xfrm>
+          <a:prstGeom prst="rect">
+            <a:avLst/>
+          </a:prstGeom>
+          <a:noFill/>
+        </p:spPr>
+        <p:txBody>
+          <a:bodyPr wrap="none" rtlCol="0">
+            <a:spAutoFit/>
+          </a:bodyPr>
+          <a:lstStyle/>
+          <a:p>
+            <a:r>
+              <a:rPr lang="en-US" dirty="0"/>
+              <a:t>Visit </a:t>
+            </a:r>
+            <a:r>
+              <a:rPr lang="en-US" b="1" dirty="0"/>
+              <a:t>https://</a:t>
+            </a:r>
+            <a:r>
+              <a:rPr lang="en-US" b="1" dirty="0" err="1"/>
+              <a:t>github.com</a:t>
+            </a:r>
+            <a:r>
+              <a:rPr lang="en-US" b="1" dirty="0"/>
+              <a:t>/Matt-Hays/csi-5347-course-project </a:t>
+            </a:r>
+            <a:r>
+              <a:rPr lang="en-US" dirty="0"/>
+              <a:t>for more information.</a:t>
+            </a:r>
+          </a:p>
+        </p:txBody>
+      </p:sp>
+    </p:spTree>
+    <p:extLst>
+      <p:ext uri="{BB962C8B-B14F-4D97-AF65-F5344CB8AC3E}">
+        <p14:creationId xmlns:p14="http://schemas.microsoft.com/office/powerpoint/2010/main" val="3228207406"/>
+      </p:ext>
+    </p:extLst>
+  </p:cSld>
+  <p:clrMapOvr>
+    <a:masterClrMapping/>
+  </p:clrMapOvr>
+</p:sld>
+</file>
+
+<file path=ppt/slides/slide12.xml><?xml version="1.0" encoding="utf-8"?>
+<p:sld xmlns:a="http://schemas.openxmlformats.org/drawingml/2006/main" xmlns:r="http://schemas.openxmlformats.org/officeDocument/2006/relationships" xmlns:p="http://schemas.openxmlformats.org/presentationml/2006/main">
+  <p:cSld>
+    <p:spTree>
+      <p:nvGrpSpPr>
+        <p:cNvPr id="1" name="">
+          <a:extLst>
+            <a:ext uri="{FF2B5EF4-FFF2-40B4-BE49-F238E27FC236}">
+              <a16:creationId xmlns:a16="http://schemas.microsoft.com/office/drawing/2014/main" id="{9FAECD21-8276-0A34-612F-2E7B6F32D014}"/>
+            </a:ext>
+          </a:extLst>
+        </p:cNvPr>
+        <p:cNvGrpSpPr/>
+        <p:nvPr/>
+      </p:nvGrpSpPr>
+      <p:grpSpPr>
+        <a:xfrm>
+          <a:off x="0" y="0"/>
+          <a:ext cx="0" cy="0"/>
+          <a:chOff x="0" y="0"/>
+          <a:chExt cx="0" cy="0"/>
+        </a:xfrm>
+      </p:grpSpPr>
+      <p:sp>
+        <p:nvSpPr>
+          <p:cNvPr id="2" name="Title 1">
+            <a:extLst>
+              <a:ext uri="{FF2B5EF4-FFF2-40B4-BE49-F238E27FC236}">
+                <a16:creationId xmlns:a16="http://schemas.microsoft.com/office/drawing/2014/main" id="{BCE5C512-2606-F10C-41F7-9FBF4FF4E5D1}"/>
+              </a:ext>
+            </a:extLst>
+          </p:cNvPr>
+          <p:cNvSpPr txBox="1">
+            <a:spLocks/>
+          </p:cNvSpPr>
+          <p:nvPr/>
+        </p:nvSpPr>
+        <p:spPr>
+          <a:xfrm>
+            <a:off x="3552429" y="696942"/>
+            <a:ext cx="7205686" cy="677405"/>
+          </a:xfrm>
+          <a:prstGeom prst="rect">
+            <a:avLst/>
+          </a:prstGeom>
+        </p:spPr>
+        <p:txBody>
+          <a:bodyPr/>
+          <a:lstStyle>
+            <a:lvl1pPr algn="l" defTabSz="914400" rtl="0" eaLnBrk="1" latinLnBrk="0" hangingPunct="1">
+              <a:lnSpc>
+                <a:spcPct val="90000"/>
+              </a:lnSpc>
+              <a:spcBef>
+                <a:spcPct val="0"/>
+              </a:spcBef>
+              <a:buNone/>
+              <a:defRPr sz="4400" kern="1200">
+                <a:solidFill>
+                  <a:schemeClr val="tx1"/>
+                </a:solidFill>
+                <a:latin typeface="+mj-lt"/>
+                <a:ea typeface="+mj-ea"/>
+                <a:cs typeface="+mj-cs"/>
+              </a:defRPr>
+            </a:lvl1pPr>
+          </a:lstStyle>
+          <a:p>
+            <a:r>
+              <a:rPr lang="en-US" altLang="en-US" b="1" dirty="0">
+                <a:solidFill>
+                  <a:srgbClr val="1E482A"/>
+                </a:solidFill>
+                <a:latin typeface="Calibri" charset="0"/>
+                <a:ea typeface="Calibri" charset="0"/>
+                <a:cs typeface="Calibri" charset="0"/>
+              </a:rPr>
+              <a:t>Codebase</a:t>
+            </a:r>
+          </a:p>
+        </p:txBody>
+      </p:sp>
+      <p:sp>
+        <p:nvSpPr>
+          <p:cNvPr id="3" name="Content Placeholder 2">
+            <a:extLst>
+              <a:ext uri="{FF2B5EF4-FFF2-40B4-BE49-F238E27FC236}">
+                <a16:creationId xmlns:a16="http://schemas.microsoft.com/office/drawing/2014/main" id="{299C4729-FF8C-A5F1-3657-E7F48B64E9BA}"/>
+              </a:ext>
+            </a:extLst>
+          </p:cNvPr>
+          <p:cNvSpPr txBox="1">
+            <a:spLocks/>
+          </p:cNvSpPr>
+          <p:nvPr/>
+        </p:nvSpPr>
+        <p:spPr>
+          <a:xfrm>
+            <a:off x="3552428" y="1506551"/>
+            <a:ext cx="7205685" cy="3844897"/>
+          </a:xfrm>
+          <a:prstGeom prst="rect">
+            <a:avLst/>
+          </a:prstGeom>
+        </p:spPr>
+        <p:txBody>
+          <a:bodyPr/>
+          <a:lstStyle>
+            <a:lvl1pPr marL="228600" indent="-228600" algn="l" defTabSz="914400" rtl="0" eaLnBrk="1" latinLnBrk="0" hangingPunct="1">
+              <a:lnSpc>
+                <a:spcPct val="90000"/>
+              </a:lnSpc>
+              <a:spcBef>
+                <a:spcPts val="1000"/>
+              </a:spcBef>
+              <a:buFont typeface="Arial"/>
+              <a:buChar char="•"/>
+              <a:defRPr sz="2800" kern="1200">
+                <a:solidFill>
+                  <a:schemeClr val="tx1"/>
+                </a:solidFill>
+                <a:latin typeface="+mn-lt"/>
+                <a:ea typeface="+mn-ea"/>
+                <a:cs typeface="+mn-cs"/>
+              </a:defRPr>
+            </a:lvl1pPr>
+            <a:lvl2pPr marL="685800" indent="-228600" algn="l" defTabSz="914400" rtl="0" eaLnBrk="1" latinLnBrk="0" hangingPunct="1">
+              <a:lnSpc>
+                <a:spcPct val="90000"/>
+              </a:lnSpc>
+              <a:spcBef>
+                <a:spcPts val="500"/>
+              </a:spcBef>
+              <a:buFont typeface="Arial"/>
+              <a:buChar char="•"/>
+              <a:defRPr sz="2400" kern="1200">
+                <a:solidFill>
+                  <a:schemeClr val="tx1"/>
+                </a:solidFill>
+                <a:latin typeface="+mn-lt"/>
+                <a:ea typeface="+mn-ea"/>
+                <a:cs typeface="+mn-cs"/>
+              </a:defRPr>
+            </a:lvl2pPr>
+            <a:lvl3pPr marL="1143000" indent="-228600" algn="l" defTabSz="914400" rtl="0" eaLnBrk="1" latinLnBrk="0" hangingPunct="1">
+              <a:lnSpc>
+                <a:spcPct val="90000"/>
+              </a:lnSpc>
+              <a:spcBef>
+                <a:spcPts val="500"/>
+              </a:spcBef>
+              <a:buFont typeface="Arial"/>
+              <a:buChar char="•"/>
+              <a:defRPr sz="2000" kern="1200">
+                <a:solidFill>
+                  <a:schemeClr val="tx1"/>
+                </a:solidFill>
+                <a:latin typeface="+mn-lt"/>
+                <a:ea typeface="+mn-ea"/>
+                <a:cs typeface="+mn-cs"/>
+              </a:defRPr>
+            </a:lvl3pPr>
+            <a:lvl4pPr marL="1600200" indent="-228600" algn="l" defTabSz="914400" rtl="0" eaLnBrk="1" latinLnBrk="0" hangingPunct="1">
+              <a:lnSpc>
+                <a:spcPct val="90000"/>
+              </a:lnSpc>
+              <a:spcBef>
+                <a:spcPts val="500"/>
+              </a:spcBef>
+              <a:buFont typeface="Arial"/>
+              <a:buChar char="•"/>
+              <a:defRPr sz="1800" kern="1200">
+                <a:solidFill>
+                  <a:schemeClr val="tx1"/>
+                </a:solidFill>
+                <a:latin typeface="+mn-lt"/>
+                <a:ea typeface="+mn-ea"/>
+                <a:cs typeface="+mn-cs"/>
+              </a:defRPr>
+            </a:lvl4pPr>
+            <a:lvl5pPr marL="2057400" indent="-228600" algn="l" defTabSz="914400" rtl="0" eaLnBrk="1" latinLnBrk="0" hangingPunct="1">
+              <a:lnSpc>
+                <a:spcPct val="90000"/>
+              </a:lnSpc>
+              <a:spcBef>
+                <a:spcPts val="500"/>
+              </a:spcBef>
+              <a:buFont typeface="Arial"/>
+              <a:buChar char="•"/>
+              <a:defRPr sz="1800" kern="1200">
+                <a:solidFill>
+                  <a:schemeClr val="tx1"/>
+                </a:solidFill>
+                <a:latin typeface="+mn-lt"/>
+                <a:ea typeface="+mn-ea"/>
+                <a:cs typeface="+mn-cs"/>
+              </a:defRPr>
+            </a:lvl5pPr>
+            <a:lvl6pPr marL="2514600" indent="-228600" algn="l" defTabSz="914400" rtl="0" eaLnBrk="1" latinLnBrk="0" hangingPunct="1">
+              <a:lnSpc>
+                <a:spcPct val="90000"/>
+              </a:lnSpc>
+              <a:spcBef>
+                <a:spcPts val="500"/>
+              </a:spcBef>
+              <a:buFont typeface="Arial"/>
+              <a:buChar char="•"/>
+              <a:defRPr sz="1800" kern="1200">
+                <a:solidFill>
+                  <a:schemeClr val="tx1"/>
+                </a:solidFill>
+                <a:latin typeface="+mn-lt"/>
+                <a:ea typeface="+mn-ea"/>
+                <a:cs typeface="+mn-cs"/>
+              </a:defRPr>
+            </a:lvl6pPr>
+            <a:lvl7pPr marL="2971800" indent="-228600" algn="l" defTabSz="914400" rtl="0" eaLnBrk="1" latinLnBrk="0" hangingPunct="1">
+              <a:lnSpc>
+                <a:spcPct val="90000"/>
+              </a:lnSpc>
+              <a:spcBef>
+                <a:spcPts val="500"/>
+              </a:spcBef>
+              <a:buFont typeface="Arial"/>
+              <a:buChar char="•"/>
+              <a:defRPr sz="1800" kern="1200">
+                <a:solidFill>
+                  <a:schemeClr val="tx1"/>
+                </a:solidFill>
+                <a:latin typeface="+mn-lt"/>
+                <a:ea typeface="+mn-ea"/>
+                <a:cs typeface="+mn-cs"/>
+              </a:defRPr>
+            </a:lvl7pPr>
+            <a:lvl8pPr marL="3429000" indent="-228600" algn="l" defTabSz="914400" rtl="0" eaLnBrk="1" latinLnBrk="0" hangingPunct="1">
+              <a:lnSpc>
+                <a:spcPct val="90000"/>
+              </a:lnSpc>
+              <a:spcBef>
+                <a:spcPts val="500"/>
+              </a:spcBef>
+              <a:buFont typeface="Arial"/>
+              <a:buChar char="•"/>
+              <a:defRPr sz="1800" kern="1200">
+                <a:solidFill>
+                  <a:schemeClr val="tx1"/>
+                </a:solidFill>
+                <a:latin typeface="+mn-lt"/>
+                <a:ea typeface="+mn-ea"/>
+                <a:cs typeface="+mn-cs"/>
+              </a:defRPr>
+            </a:lvl8pPr>
+            <a:lvl9pPr marL="3886200" indent="-228600" algn="l" defTabSz="914400" rtl="0" eaLnBrk="1" latinLnBrk="0" hangingPunct="1">
+              <a:lnSpc>
+                <a:spcPct val="90000"/>
+              </a:lnSpc>
+              <a:spcBef>
+                <a:spcPts val="500"/>
+              </a:spcBef>
+              <a:buFont typeface="Arial"/>
+              <a:buChar char="•"/>
+              <a:defRPr sz="1800" kern="1200">
+                <a:solidFill>
+                  <a:schemeClr val="tx1"/>
+                </a:solidFill>
+                <a:latin typeface="+mn-lt"/>
+                <a:ea typeface="+mn-ea"/>
+                <a:cs typeface="+mn-cs"/>
+              </a:defRPr>
+            </a:lvl9pPr>
+          </a:lstStyle>
+          <a:p>
+            <a:pPr>
+              <a:lnSpc>
+                <a:spcPct val="100000"/>
+              </a:lnSpc>
+              <a:spcBef>
+                <a:spcPts val="0"/>
+              </a:spcBef>
+            </a:pPr>
+            <a:r>
+              <a:rPr lang="en-US" dirty="0"/>
+              <a:t> https://</a:t>
+            </a:r>
+            <a:r>
+              <a:rPr lang="en-US" dirty="0" err="1"/>
+              <a:t>github.com</a:t>
+            </a:r>
+            <a:r>
+              <a:rPr lang="en-US" dirty="0"/>
+              <a:t>/Matt-Hays/csi-5347-course-project </a:t>
+            </a:r>
+          </a:p>
+          <a:p>
+            <a:pPr>
+              <a:lnSpc>
+                <a:spcPct val="100000"/>
+              </a:lnSpc>
+              <a:spcBef>
+                <a:spcPts val="0"/>
+              </a:spcBef>
+            </a:pPr>
+            <a:r>
+              <a:rPr lang="en-US" altLang="en-US" dirty="0">
+                <a:ea typeface="ＭＳ Ｐゴシック" charset="-128"/>
+              </a:rPr>
+              <a:t>Each service consists of a single, isolated codebase.</a:t>
+            </a:r>
+          </a:p>
+          <a:p>
+            <a:pPr>
+              <a:lnSpc>
+                <a:spcPct val="100000"/>
+              </a:lnSpc>
+              <a:spcBef>
+                <a:spcPts val="0"/>
+              </a:spcBef>
+            </a:pPr>
+            <a:endParaRPr lang="en-US" altLang="en-US" dirty="0">
+              <a:ea typeface="ＭＳ Ｐゴシック" charset="-128"/>
+            </a:endParaRPr>
+          </a:p>
+        </p:txBody>
+      </p:sp>
+      <p:pic>
+        <p:nvPicPr>
+          <p:cNvPr id="5" name="Picture 4" descr="A screenshot of a computer&#10;&#10;AI-generated content may be incorrect.">
+            <a:extLst>
+              <a:ext uri="{FF2B5EF4-FFF2-40B4-BE49-F238E27FC236}">
+                <a16:creationId xmlns:a16="http://schemas.microsoft.com/office/drawing/2014/main" id="{A5E920C8-5A0B-ABA4-B6CB-B755F597B0EF}"/>
+              </a:ext>
+            </a:extLst>
+          </p:cNvPr>
+          <p:cNvPicPr>
+            <a:picLocks noChangeAspect="1"/>
+          </p:cNvPicPr>
+          <p:nvPr/>
+        </p:nvPicPr>
+        <p:blipFill>
+          <a:blip r:embed="rId3">
+            <a:extLst>
+              <a:ext uri="{28A0092B-C50C-407E-A947-70E740481C1C}">
+                <a14:useLocalDpi xmlns:a14="http://schemas.microsoft.com/office/drawing/2010/main" val="0"/>
+              </a:ext>
+            </a:extLst>
+          </a:blip>
+          <a:stretch>
+            <a:fillRect/>
+          </a:stretch>
+        </p:blipFill>
+        <p:spPr>
+          <a:xfrm>
+            <a:off x="4284107" y="3428999"/>
+            <a:ext cx="5742326" cy="3361594"/>
+          </a:xfrm>
+          <a:prstGeom prst="rect">
+            <a:avLst/>
+          </a:prstGeom>
+        </p:spPr>
+      </p:pic>
+    </p:spTree>
+    <p:extLst>
+      <p:ext uri="{BB962C8B-B14F-4D97-AF65-F5344CB8AC3E}">
+        <p14:creationId xmlns:p14="http://schemas.microsoft.com/office/powerpoint/2010/main" val="521720647"/>
+      </p:ext>
+    </p:extLst>
+  </p:cSld>
+  <p:clrMapOvr>
+    <a:masterClrMapping/>
+  </p:clrMapOvr>
+</p:sld>
+</file>
+
+<file path=ppt/slides/slide13.xml><?xml version="1.0" encoding="utf-8"?>
+<p:sld xmlns:a="http://schemas.openxmlformats.org/drawingml/2006/main" xmlns:r="http://schemas.openxmlformats.org/officeDocument/2006/relationships" xmlns:p="http://schemas.openxmlformats.org/presentationml/2006/main">
+  <p:cSld>
+    <p:spTree>
+      <p:nvGrpSpPr>
+        <p:cNvPr id="1" name="">
+          <a:extLst>
+            <a:ext uri="{FF2B5EF4-FFF2-40B4-BE49-F238E27FC236}">
+              <a16:creationId xmlns:a16="http://schemas.microsoft.com/office/drawing/2014/main" id="{5BB72CCD-AC91-97C9-DD07-4F43C740381E}"/>
+            </a:ext>
+          </a:extLst>
+        </p:cNvPr>
+        <p:cNvGrpSpPr/>
+        <p:nvPr/>
+      </p:nvGrpSpPr>
+      <p:grpSpPr>
+        <a:xfrm>
+          <a:off x="0" y="0"/>
+          <a:ext cx="0" cy="0"/>
+          <a:chOff x="0" y="0"/>
+          <a:chExt cx="0" cy="0"/>
+        </a:xfrm>
+      </p:grpSpPr>
+      <p:sp>
+        <p:nvSpPr>
+          <p:cNvPr id="2" name="Title 1">
+            <a:extLst>
+              <a:ext uri="{FF2B5EF4-FFF2-40B4-BE49-F238E27FC236}">
+                <a16:creationId xmlns:a16="http://schemas.microsoft.com/office/drawing/2014/main" id="{D961AA19-0460-4DB2-4EBB-6986CA01BF46}"/>
+              </a:ext>
+            </a:extLst>
+          </p:cNvPr>
+          <p:cNvSpPr txBox="1">
+            <a:spLocks/>
+          </p:cNvSpPr>
+          <p:nvPr/>
+        </p:nvSpPr>
+        <p:spPr>
+          <a:xfrm>
+            <a:off x="3552429" y="696942"/>
+            <a:ext cx="7205686" cy="677405"/>
+          </a:xfrm>
+          <a:prstGeom prst="rect">
+            <a:avLst/>
+          </a:prstGeom>
+        </p:spPr>
+        <p:txBody>
+          <a:bodyPr lIns="91440" tIns="45720" rIns="91440" bIns="45720" anchor="t"/>
+          <a:lstStyle>
+            <a:lvl1pPr algn="l" defTabSz="914400" rtl="0" eaLnBrk="1" latinLnBrk="0" hangingPunct="1">
+              <a:lnSpc>
+                <a:spcPct val="90000"/>
+              </a:lnSpc>
+              <a:spcBef>
+                <a:spcPct val="0"/>
+              </a:spcBef>
+              <a:buNone/>
+              <a:defRPr sz="4400" kern="1200">
+                <a:solidFill>
+                  <a:schemeClr val="tx1"/>
+                </a:solidFill>
+                <a:latin typeface="+mj-lt"/>
+                <a:ea typeface="+mj-ea"/>
+                <a:cs typeface="+mj-cs"/>
+              </a:defRPr>
+            </a:lvl1pPr>
+          </a:lstStyle>
+          <a:p>
+            <a:r>
+              <a:rPr lang="en-US" altLang="en-US" b="1">
+                <a:solidFill>
+                  <a:srgbClr val="1E482A"/>
+                </a:solidFill>
+                <a:latin typeface="Calibri"/>
+                <a:ea typeface="Calibri"/>
+                <a:cs typeface="Calibri"/>
+              </a:rPr>
+              <a:t>Demonstration</a:t>
+            </a:r>
+            <a:endParaRPr lang="en-US" err="1"/>
+          </a:p>
+        </p:txBody>
+      </p:sp>
+      <p:sp>
+        <p:nvSpPr>
+          <p:cNvPr id="3" name="Content Placeholder 2">
+            <a:extLst>
+              <a:ext uri="{FF2B5EF4-FFF2-40B4-BE49-F238E27FC236}">
+                <a16:creationId xmlns:a16="http://schemas.microsoft.com/office/drawing/2014/main" id="{F53D4F01-BCF6-0D05-641F-7ED388BF598A}"/>
+              </a:ext>
+            </a:extLst>
+          </p:cNvPr>
+          <p:cNvSpPr txBox="1">
+            <a:spLocks/>
+          </p:cNvSpPr>
+          <p:nvPr/>
+        </p:nvSpPr>
+        <p:spPr>
+          <a:xfrm>
+            <a:off x="3552428" y="1506551"/>
+            <a:ext cx="7205685" cy="3844897"/>
+          </a:xfrm>
+          <a:prstGeom prst="rect">
+            <a:avLst/>
+          </a:prstGeom>
+        </p:spPr>
+        <p:txBody>
+          <a:bodyPr/>
+          <a:lstStyle>
+            <a:lvl1pPr marL="228600" indent="-228600" algn="l" defTabSz="914400" rtl="0" eaLnBrk="1" latinLnBrk="0" hangingPunct="1">
+              <a:lnSpc>
+                <a:spcPct val="90000"/>
+              </a:lnSpc>
+              <a:spcBef>
+                <a:spcPts val="1000"/>
+              </a:spcBef>
+              <a:buFont typeface="Arial"/>
+              <a:buChar char="•"/>
+              <a:defRPr sz="2800" kern="1200">
+                <a:solidFill>
+                  <a:schemeClr val="tx1"/>
+                </a:solidFill>
+                <a:latin typeface="+mn-lt"/>
+                <a:ea typeface="+mn-ea"/>
+                <a:cs typeface="+mn-cs"/>
+              </a:defRPr>
+            </a:lvl1pPr>
+            <a:lvl2pPr marL="685800" indent="-228600" algn="l" defTabSz="914400" rtl="0" eaLnBrk="1" latinLnBrk="0" hangingPunct="1">
+              <a:lnSpc>
+                <a:spcPct val="90000"/>
+              </a:lnSpc>
+              <a:spcBef>
+                <a:spcPts val="500"/>
+              </a:spcBef>
+              <a:buFont typeface="Arial"/>
+              <a:buChar char="•"/>
+              <a:defRPr sz="2400" kern="1200">
+                <a:solidFill>
+                  <a:schemeClr val="tx1"/>
+                </a:solidFill>
+                <a:latin typeface="+mn-lt"/>
+                <a:ea typeface="+mn-ea"/>
+                <a:cs typeface="+mn-cs"/>
+              </a:defRPr>
+            </a:lvl2pPr>
+            <a:lvl3pPr marL="1143000" indent="-228600" algn="l" defTabSz="914400" rtl="0" eaLnBrk="1" latinLnBrk="0" hangingPunct="1">
+              <a:lnSpc>
+                <a:spcPct val="90000"/>
+              </a:lnSpc>
+              <a:spcBef>
+                <a:spcPts val="500"/>
+              </a:spcBef>
+              <a:buFont typeface="Arial"/>
+              <a:buChar char="•"/>
+              <a:defRPr sz="2000" kern="1200">
+                <a:solidFill>
+                  <a:schemeClr val="tx1"/>
+                </a:solidFill>
+                <a:latin typeface="+mn-lt"/>
+                <a:ea typeface="+mn-ea"/>
+                <a:cs typeface="+mn-cs"/>
+              </a:defRPr>
+            </a:lvl3pPr>
+            <a:lvl4pPr marL="1600200" indent="-228600" algn="l" defTabSz="914400" rtl="0" eaLnBrk="1" latinLnBrk="0" hangingPunct="1">
+              <a:lnSpc>
+                <a:spcPct val="90000"/>
+              </a:lnSpc>
+              <a:spcBef>
+                <a:spcPts val="500"/>
+              </a:spcBef>
+              <a:buFont typeface="Arial"/>
+              <a:buChar char="•"/>
+              <a:defRPr sz="1800" kern="1200">
+                <a:solidFill>
+                  <a:schemeClr val="tx1"/>
+                </a:solidFill>
+                <a:latin typeface="+mn-lt"/>
+                <a:ea typeface="+mn-ea"/>
+                <a:cs typeface="+mn-cs"/>
+              </a:defRPr>
+            </a:lvl4pPr>
+            <a:lvl5pPr marL="2057400" indent="-228600" algn="l" defTabSz="914400" rtl="0" eaLnBrk="1" latinLnBrk="0" hangingPunct="1">
+              <a:lnSpc>
+                <a:spcPct val="90000"/>
+              </a:lnSpc>
+              <a:spcBef>
+                <a:spcPts val="500"/>
+              </a:spcBef>
+              <a:buFont typeface="Arial"/>
+              <a:buChar char="•"/>
+              <a:defRPr sz="1800" kern="1200">
+                <a:solidFill>
+                  <a:schemeClr val="tx1"/>
+                </a:solidFill>
+                <a:latin typeface="+mn-lt"/>
+                <a:ea typeface="+mn-ea"/>
+                <a:cs typeface="+mn-cs"/>
+              </a:defRPr>
+            </a:lvl5pPr>
+            <a:lvl6pPr marL="2514600" indent="-228600" algn="l" defTabSz="914400" rtl="0" eaLnBrk="1" latinLnBrk="0" hangingPunct="1">
+              <a:lnSpc>
+                <a:spcPct val="90000"/>
+              </a:lnSpc>
+              <a:spcBef>
+                <a:spcPts val="500"/>
+              </a:spcBef>
+              <a:buFont typeface="Arial"/>
+              <a:buChar char="•"/>
+              <a:defRPr sz="1800" kern="1200">
+                <a:solidFill>
+                  <a:schemeClr val="tx1"/>
+                </a:solidFill>
+                <a:latin typeface="+mn-lt"/>
+                <a:ea typeface="+mn-ea"/>
+                <a:cs typeface="+mn-cs"/>
+              </a:defRPr>
+            </a:lvl6pPr>
+            <a:lvl7pPr marL="2971800" indent="-228600" algn="l" defTabSz="914400" rtl="0" eaLnBrk="1" latinLnBrk="0" hangingPunct="1">
+              <a:lnSpc>
+                <a:spcPct val="90000"/>
+              </a:lnSpc>
+              <a:spcBef>
+                <a:spcPts val="500"/>
+              </a:spcBef>
+              <a:buFont typeface="Arial"/>
+              <a:buChar char="•"/>
+              <a:defRPr sz="1800" kern="1200">
+                <a:solidFill>
+                  <a:schemeClr val="tx1"/>
+                </a:solidFill>
+                <a:latin typeface="+mn-lt"/>
+                <a:ea typeface="+mn-ea"/>
+                <a:cs typeface="+mn-cs"/>
+              </a:defRPr>
+            </a:lvl7pPr>
+            <a:lvl8pPr marL="3429000" indent="-228600" algn="l" defTabSz="914400" rtl="0" eaLnBrk="1" latinLnBrk="0" hangingPunct="1">
+              <a:lnSpc>
+                <a:spcPct val="90000"/>
+              </a:lnSpc>
+              <a:spcBef>
+                <a:spcPts val="500"/>
+              </a:spcBef>
+              <a:buFont typeface="Arial"/>
+              <a:buChar char="•"/>
+              <a:defRPr sz="1800" kern="1200">
+                <a:solidFill>
+                  <a:schemeClr val="tx1"/>
+                </a:solidFill>
+                <a:latin typeface="+mn-lt"/>
+                <a:ea typeface="+mn-ea"/>
+                <a:cs typeface="+mn-cs"/>
+              </a:defRPr>
+            </a:lvl8pPr>
+            <a:lvl9pPr marL="3886200" indent="-228600" algn="l" defTabSz="914400" rtl="0" eaLnBrk="1" latinLnBrk="0" hangingPunct="1">
+              <a:lnSpc>
+                <a:spcPct val="90000"/>
+              </a:lnSpc>
+              <a:spcBef>
+                <a:spcPts val="500"/>
+              </a:spcBef>
+              <a:buFont typeface="Arial"/>
+              <a:buChar char="•"/>
+              <a:defRPr sz="1800" kern="1200">
+                <a:solidFill>
+                  <a:schemeClr val="tx1"/>
+                </a:solidFill>
+                <a:latin typeface="+mn-lt"/>
+                <a:ea typeface="+mn-ea"/>
+                <a:cs typeface="+mn-cs"/>
+              </a:defRPr>
+            </a:lvl9pPr>
+          </a:lstStyle>
+          <a:p>
+            <a:pPr lvl="2">
+              <a:lnSpc>
+                <a:spcPct val="100000"/>
+              </a:lnSpc>
+              <a:spcBef>
+                <a:spcPts val="0"/>
+              </a:spcBef>
+            </a:pPr>
+            <a:endParaRPr lang="en-US" altLang="en-US">
+              <a:ea typeface="ＭＳ Ｐゴシック" charset="-128"/>
+            </a:endParaRPr>
+          </a:p>
+        </p:txBody>
+      </p:sp>
+      <p:pic>
+        <p:nvPicPr>
+          <p:cNvPr id="4" name="Picture 3" descr="A blue whale with blocks on it&#10;&#10;AI-generated content may be incorrect.">
+            <a:extLst>
+              <a:ext uri="{FF2B5EF4-FFF2-40B4-BE49-F238E27FC236}">
+                <a16:creationId xmlns:a16="http://schemas.microsoft.com/office/drawing/2014/main" id="{80E740E1-04F7-9CB4-31E0-7D0B52A99270}"/>
+              </a:ext>
+            </a:extLst>
+          </p:cNvPr>
+          <p:cNvPicPr>
+            <a:picLocks noChangeAspect="1"/>
+          </p:cNvPicPr>
+          <p:nvPr/>
+        </p:nvPicPr>
+        <p:blipFill>
+          <a:blip r:embed="rId3"/>
+          <a:stretch>
+            <a:fillRect/>
+          </a:stretch>
+        </p:blipFill>
+        <p:spPr>
+          <a:xfrm>
+            <a:off x="4733925" y="1714500"/>
+            <a:ext cx="4467225" cy="4467225"/>
+          </a:xfrm>
+          <a:prstGeom prst="rect">
+            <a:avLst/>
+          </a:prstGeom>
+        </p:spPr>
+      </p:pic>
+    </p:spTree>
+    <p:extLst>
+      <p:ext uri="{BB962C8B-B14F-4D97-AF65-F5344CB8AC3E}">
+        <p14:creationId xmlns:p14="http://schemas.microsoft.com/office/powerpoint/2010/main" val="947546317"/>
+      </p:ext>
+    </p:extLst>
+  </p:cSld>
+  <p:clrMapOvr>
+    <a:masterClrMapping/>
+  </p:clrMapOvr>
+</p:sld>
+</file>
+
+<file path=ppt/slides/slide14.xml><?xml version="1.0" encoding="utf-8"?>
+<p:sld xmlns:a="http://schemas.openxmlformats.org/drawingml/2006/main" xmlns:r="http://schemas.openxmlformats.org/officeDocument/2006/relationships" xmlns:p="http://schemas.openxmlformats.org/presentationml/2006/main">
+  <p:cSld>
+    <p:spTree>
+      <p:nvGrpSpPr>
+        <p:cNvPr id="1" name="">
+          <a:extLst>
+            <a:ext uri="{FF2B5EF4-FFF2-40B4-BE49-F238E27FC236}">
+              <a16:creationId xmlns:a16="http://schemas.microsoft.com/office/drawing/2014/main" id="{92E20D7E-E0B3-8712-2609-3A1AC8618114}"/>
+            </a:ext>
+          </a:extLst>
+        </p:cNvPr>
+        <p:cNvGrpSpPr/>
+        <p:nvPr/>
+      </p:nvGrpSpPr>
+      <p:grpSpPr>
+        <a:xfrm>
+          <a:off x="0" y="0"/>
+          <a:ext cx="0" cy="0"/>
+          <a:chOff x="0" y="0"/>
+          <a:chExt cx="0" cy="0"/>
+        </a:xfrm>
+      </p:grpSpPr>
+      <p:sp>
+        <p:nvSpPr>
+          <p:cNvPr id="2" name="Title 1">
+            <a:extLst>
+              <a:ext uri="{FF2B5EF4-FFF2-40B4-BE49-F238E27FC236}">
+                <a16:creationId xmlns:a16="http://schemas.microsoft.com/office/drawing/2014/main" id="{192DB44F-A69B-E1CC-FB1A-2D2049001179}"/>
+              </a:ext>
+            </a:extLst>
+          </p:cNvPr>
+          <p:cNvSpPr txBox="1">
+            <a:spLocks/>
+          </p:cNvSpPr>
+          <p:nvPr/>
+        </p:nvSpPr>
+        <p:spPr>
+          <a:xfrm>
+            <a:off x="3552429" y="696942"/>
+            <a:ext cx="7205686" cy="677405"/>
+          </a:xfrm>
+          <a:prstGeom prst="rect">
+            <a:avLst/>
+          </a:prstGeom>
+        </p:spPr>
+        <p:txBody>
+          <a:bodyPr lIns="91440" tIns="45720" rIns="91440" bIns="45720" anchor="t"/>
+          <a:lstStyle>
+            <a:lvl1pPr algn="l" defTabSz="914400" rtl="0" eaLnBrk="1" latinLnBrk="0" hangingPunct="1">
+              <a:lnSpc>
+                <a:spcPct val="90000"/>
+              </a:lnSpc>
+              <a:spcBef>
+                <a:spcPct val="0"/>
+              </a:spcBef>
+              <a:buNone/>
+              <a:defRPr sz="4400" kern="1200">
+                <a:solidFill>
+                  <a:schemeClr val="tx1"/>
+                </a:solidFill>
+                <a:latin typeface="+mj-lt"/>
+                <a:ea typeface="+mj-ea"/>
+                <a:cs typeface="+mj-cs"/>
+              </a:defRPr>
+            </a:lvl1pPr>
+          </a:lstStyle>
+          <a:p>
+            <a:r>
+              <a:rPr lang="en-US" altLang="en-US" b="1">
+                <a:solidFill>
+                  <a:srgbClr val="1E482A"/>
+                </a:solidFill>
+                <a:ea typeface="Calibri"/>
+                <a:cs typeface="Calibri"/>
+              </a:rPr>
+              <a:t>Next Steps</a:t>
+            </a:r>
+          </a:p>
+        </p:txBody>
+      </p:sp>
+      <p:sp>
+        <p:nvSpPr>
+          <p:cNvPr id="5" name="Content Placeholder 2">
+            <a:extLst>
+              <a:ext uri="{FF2B5EF4-FFF2-40B4-BE49-F238E27FC236}">
+                <a16:creationId xmlns:a16="http://schemas.microsoft.com/office/drawing/2014/main" id="{9034ADCF-916C-4D20-4F16-8086C565F7EC}"/>
+              </a:ext>
+            </a:extLst>
+          </p:cNvPr>
+          <p:cNvSpPr txBox="1">
+            <a:spLocks/>
+          </p:cNvSpPr>
+          <p:nvPr/>
+        </p:nvSpPr>
+        <p:spPr>
+          <a:xfrm>
+            <a:off x="3552428" y="1506551"/>
+            <a:ext cx="7205685" cy="3844897"/>
+          </a:xfrm>
+          <a:prstGeom prst="rect">
+            <a:avLst/>
+          </a:prstGeom>
+        </p:spPr>
+        <p:txBody>
+          <a:bodyPr lIns="91440" tIns="45720" rIns="91440" bIns="45720" anchor="t"/>
+          <a:lstStyle>
+            <a:lvl1pPr marL="228600" indent="-228600" algn="l" defTabSz="914400" rtl="0" eaLnBrk="1" latinLnBrk="0" hangingPunct="1">
+              <a:lnSpc>
+                <a:spcPct val="90000"/>
+              </a:lnSpc>
+              <a:spcBef>
+                <a:spcPts val="1000"/>
+              </a:spcBef>
+              <a:buFont typeface="Arial"/>
+              <a:buChar char="•"/>
+              <a:defRPr sz="2800" kern="1200">
+                <a:solidFill>
+                  <a:schemeClr val="tx1"/>
+                </a:solidFill>
+                <a:latin typeface="+mn-lt"/>
+                <a:ea typeface="+mn-ea"/>
+                <a:cs typeface="+mn-cs"/>
+              </a:defRPr>
+            </a:lvl1pPr>
+            <a:lvl2pPr marL="685800" indent="-228600" algn="l" defTabSz="914400" rtl="0" eaLnBrk="1" latinLnBrk="0" hangingPunct="1">
+              <a:lnSpc>
+                <a:spcPct val="90000"/>
+              </a:lnSpc>
+              <a:spcBef>
+                <a:spcPts val="500"/>
+              </a:spcBef>
+              <a:buFont typeface="Arial"/>
+              <a:buChar char="•"/>
+              <a:defRPr sz="2400" kern="1200">
+                <a:solidFill>
+                  <a:schemeClr val="tx1"/>
+                </a:solidFill>
+                <a:latin typeface="+mn-lt"/>
+                <a:ea typeface="+mn-ea"/>
+                <a:cs typeface="+mn-cs"/>
+              </a:defRPr>
+            </a:lvl2pPr>
+            <a:lvl3pPr marL="1143000" indent="-228600" algn="l" defTabSz="914400" rtl="0" eaLnBrk="1" latinLnBrk="0" hangingPunct="1">
+              <a:lnSpc>
+                <a:spcPct val="90000"/>
+              </a:lnSpc>
+              <a:spcBef>
+                <a:spcPts val="500"/>
+              </a:spcBef>
+              <a:buFont typeface="Arial"/>
+              <a:buChar char="•"/>
+              <a:defRPr sz="2000" kern="1200">
+                <a:solidFill>
+                  <a:schemeClr val="tx1"/>
+                </a:solidFill>
+                <a:latin typeface="+mn-lt"/>
+                <a:ea typeface="+mn-ea"/>
+                <a:cs typeface="+mn-cs"/>
+              </a:defRPr>
+            </a:lvl3pPr>
+            <a:lvl4pPr marL="1600200" indent="-228600" algn="l" defTabSz="914400" rtl="0" eaLnBrk="1" latinLnBrk="0" hangingPunct="1">
+              <a:lnSpc>
+                <a:spcPct val="90000"/>
+              </a:lnSpc>
+              <a:spcBef>
+                <a:spcPts val="500"/>
+              </a:spcBef>
+              <a:buFont typeface="Arial"/>
+              <a:buChar char="•"/>
+              <a:defRPr sz="1800" kern="1200">
+                <a:solidFill>
+                  <a:schemeClr val="tx1"/>
+                </a:solidFill>
+                <a:latin typeface="+mn-lt"/>
+                <a:ea typeface="+mn-ea"/>
+                <a:cs typeface="+mn-cs"/>
+              </a:defRPr>
+            </a:lvl4pPr>
+            <a:lvl5pPr marL="2057400" indent="-228600" algn="l" defTabSz="914400" rtl="0" eaLnBrk="1" latinLnBrk="0" hangingPunct="1">
+              <a:lnSpc>
+                <a:spcPct val="90000"/>
+              </a:lnSpc>
+              <a:spcBef>
+                <a:spcPts val="500"/>
+              </a:spcBef>
+              <a:buFont typeface="Arial"/>
+              <a:buChar char="•"/>
+              <a:defRPr sz="1800" kern="1200">
+                <a:solidFill>
+                  <a:schemeClr val="tx1"/>
+                </a:solidFill>
+                <a:latin typeface="+mn-lt"/>
+                <a:ea typeface="+mn-ea"/>
+                <a:cs typeface="+mn-cs"/>
+              </a:defRPr>
+            </a:lvl5pPr>
+            <a:lvl6pPr marL="2514600" indent="-228600" algn="l" defTabSz="914400" rtl="0" eaLnBrk="1" latinLnBrk="0" hangingPunct="1">
+              <a:lnSpc>
+                <a:spcPct val="90000"/>
+              </a:lnSpc>
+              <a:spcBef>
+                <a:spcPts val="500"/>
+              </a:spcBef>
+              <a:buFont typeface="Arial"/>
+              <a:buChar char="•"/>
+              <a:defRPr sz="1800" kern="1200">
+                <a:solidFill>
+                  <a:schemeClr val="tx1"/>
+                </a:solidFill>
+                <a:latin typeface="+mn-lt"/>
+                <a:ea typeface="+mn-ea"/>
+                <a:cs typeface="+mn-cs"/>
+              </a:defRPr>
+            </a:lvl6pPr>
+            <a:lvl7pPr marL="2971800" indent="-228600" algn="l" defTabSz="914400" rtl="0" eaLnBrk="1" latinLnBrk="0" hangingPunct="1">
+              <a:lnSpc>
+                <a:spcPct val="90000"/>
+              </a:lnSpc>
+              <a:spcBef>
+                <a:spcPts val="500"/>
+              </a:spcBef>
+              <a:buFont typeface="Arial"/>
+              <a:buChar char="•"/>
+              <a:defRPr sz="1800" kern="1200">
+                <a:solidFill>
+                  <a:schemeClr val="tx1"/>
+                </a:solidFill>
+                <a:latin typeface="+mn-lt"/>
+                <a:ea typeface="+mn-ea"/>
+                <a:cs typeface="+mn-cs"/>
+              </a:defRPr>
+            </a:lvl7pPr>
+            <a:lvl8pPr marL="3429000" indent="-228600" algn="l" defTabSz="914400" rtl="0" eaLnBrk="1" latinLnBrk="0" hangingPunct="1">
+              <a:lnSpc>
+                <a:spcPct val="90000"/>
+              </a:lnSpc>
+              <a:spcBef>
+                <a:spcPts val="500"/>
+              </a:spcBef>
+              <a:buFont typeface="Arial"/>
+              <a:buChar char="•"/>
+              <a:defRPr sz="1800" kern="1200">
+                <a:solidFill>
+                  <a:schemeClr val="tx1"/>
+                </a:solidFill>
+                <a:latin typeface="+mn-lt"/>
+                <a:ea typeface="+mn-ea"/>
+                <a:cs typeface="+mn-cs"/>
+              </a:defRPr>
+            </a:lvl8pPr>
+            <a:lvl9pPr marL="3886200" indent="-228600" algn="l" defTabSz="914400" rtl="0" eaLnBrk="1" latinLnBrk="0" hangingPunct="1">
+              <a:lnSpc>
+                <a:spcPct val="90000"/>
+              </a:lnSpc>
+              <a:spcBef>
+                <a:spcPts val="500"/>
+              </a:spcBef>
+              <a:buFont typeface="Arial"/>
+              <a:buChar char="•"/>
+              <a:defRPr sz="1800" kern="1200">
+                <a:solidFill>
+                  <a:schemeClr val="tx1"/>
+                </a:solidFill>
+                <a:latin typeface="+mn-lt"/>
+                <a:ea typeface="+mn-ea"/>
+                <a:cs typeface="+mn-cs"/>
+              </a:defRPr>
+            </a:lvl9pPr>
+          </a:lstStyle>
+          <a:p>
+            <a:pPr>
+              <a:lnSpc>
+                <a:spcPct val="100000"/>
+              </a:lnSpc>
+              <a:spcBef>
+                <a:spcPts val="0"/>
+              </a:spcBef>
+            </a:pPr>
+            <a:r>
+              <a:rPr lang="en-US" altLang="en-US" sz="2400" dirty="0">
+                <a:ea typeface="ＭＳ Ｐゴシック"/>
+                <a:cs typeface="Calibri"/>
+              </a:rPr>
+              <a:t>Implement the Service Discovery Agent for registration and query of services</a:t>
+            </a:r>
+          </a:p>
+          <a:p>
+            <a:pPr lvl="1">
+              <a:lnSpc>
+                <a:spcPct val="100000"/>
+              </a:lnSpc>
+              <a:spcBef>
+                <a:spcPts val="0"/>
+              </a:spcBef>
+            </a:pPr>
+            <a:r>
+              <a:rPr lang="en-US" altLang="en-US" dirty="0">
+                <a:ea typeface="ＭＳ Ｐゴシック"/>
+                <a:cs typeface="Calibri"/>
+              </a:rPr>
+              <a:t>Ensure services can query for other services</a:t>
+            </a:r>
+          </a:p>
+          <a:p>
+            <a:pPr>
+              <a:lnSpc>
+                <a:spcPct val="100000"/>
+              </a:lnSpc>
+              <a:spcBef>
+                <a:spcPts val="0"/>
+              </a:spcBef>
+            </a:pPr>
+            <a:r>
+              <a:rPr lang="en-US" altLang="en-US" sz="2400" dirty="0">
+                <a:ea typeface="ＭＳ Ｐゴシック"/>
+                <a:cs typeface="Calibri"/>
+              </a:rPr>
+              <a:t>Implement a load balancer for the services</a:t>
+            </a:r>
+          </a:p>
+          <a:p>
+            <a:pPr>
+              <a:lnSpc>
+                <a:spcPct val="100000"/>
+              </a:lnSpc>
+              <a:spcBef>
+                <a:spcPts val="0"/>
+              </a:spcBef>
+            </a:pPr>
+            <a:r>
+              <a:rPr lang="en-US" altLang="en-US" sz="2400" dirty="0">
+                <a:ea typeface="ＭＳ Ｐゴシック"/>
+                <a:cs typeface="Calibri"/>
+              </a:rPr>
+              <a:t>Finish implementing calls between services</a:t>
+            </a:r>
+            <a:endParaRPr lang="en-US" altLang="en-US" sz="2400" dirty="0">
+              <a:ea typeface="ＭＳ Ｐゴシック" charset="-128"/>
+              <a:cs typeface="Calibri"/>
+            </a:endParaRPr>
+          </a:p>
+          <a:p>
+            <a:pPr>
+              <a:lnSpc>
+                <a:spcPct val="100000"/>
+              </a:lnSpc>
+              <a:spcBef>
+                <a:spcPts val="0"/>
+              </a:spcBef>
+            </a:pPr>
+            <a:r>
+              <a:rPr lang="en-US" altLang="en-US" sz="2400" dirty="0">
+                <a:ea typeface="ＭＳ Ｐゴシック"/>
+                <a:cs typeface="Calibri"/>
+              </a:rPr>
+              <a:t>Implement resiliency patterns between services</a:t>
+            </a:r>
+          </a:p>
+          <a:p>
+            <a:pPr>
+              <a:lnSpc>
+                <a:spcPct val="100000"/>
+              </a:lnSpc>
+              <a:spcBef>
+                <a:spcPts val="0"/>
+              </a:spcBef>
+            </a:pPr>
+            <a:r>
+              <a:rPr lang="en-US" altLang="en-US" sz="2400" dirty="0">
+                <a:ea typeface="ＭＳ Ｐゴシック"/>
+                <a:cs typeface="Calibri"/>
+              </a:rPr>
+              <a:t>Improve payment methodologies</a:t>
+            </a:r>
+          </a:p>
+          <a:p>
+            <a:pPr>
+              <a:lnSpc>
+                <a:spcPct val="100000"/>
+              </a:lnSpc>
+              <a:spcBef>
+                <a:spcPts val="0"/>
+              </a:spcBef>
+            </a:pPr>
+            <a:r>
+              <a:rPr lang="en-US" altLang="en-US" sz="2400" dirty="0">
+                <a:ea typeface="ＭＳ Ｐゴシック"/>
+                <a:cs typeface="Calibri"/>
+              </a:rPr>
+              <a:t>Implement centralized logging with ELK or Prometheus/Grafana</a:t>
+            </a:r>
+          </a:p>
+          <a:p>
+            <a:pPr>
+              <a:lnSpc>
+                <a:spcPct val="100000"/>
+              </a:lnSpc>
+              <a:spcBef>
+                <a:spcPts val="0"/>
+              </a:spcBef>
+            </a:pPr>
+            <a:r>
+              <a:rPr lang="en-US" altLang="en-US" sz="2400" dirty="0">
+                <a:ea typeface="ＭＳ Ｐゴシック"/>
+                <a:cs typeface="Calibri"/>
+              </a:rPr>
+              <a:t>Implement security with Spring Security and </a:t>
+            </a:r>
+            <a:r>
+              <a:rPr lang="en-US" altLang="en-US" sz="2400" dirty="0" err="1">
+                <a:ea typeface="ＭＳ Ｐゴシック"/>
+                <a:cs typeface="Calibri"/>
+              </a:rPr>
+              <a:t>Keycloak</a:t>
+            </a:r>
+            <a:endParaRPr lang="en-US" altLang="en-US" sz="2400" dirty="0">
+              <a:ea typeface="ＭＳ Ｐゴシック" charset="-128"/>
+              <a:cs typeface="Calibri"/>
+            </a:endParaRPr>
+          </a:p>
+          <a:p>
+            <a:pPr lvl="2">
+              <a:lnSpc>
+                <a:spcPct val="100000"/>
+              </a:lnSpc>
+              <a:spcBef>
+                <a:spcPts val="0"/>
+              </a:spcBef>
+            </a:pPr>
+            <a:endParaRPr lang="en-US" altLang="en-US" dirty="0">
+              <a:ea typeface="ＭＳ Ｐゴシック" charset="-128"/>
+              <a:cs typeface="Calibri"/>
+            </a:endParaRPr>
+          </a:p>
+        </p:txBody>
+      </p:sp>
+    </p:spTree>
+    <p:extLst>
+      <p:ext uri="{BB962C8B-B14F-4D97-AF65-F5344CB8AC3E}">
+        <p14:creationId xmlns:p14="http://schemas.microsoft.com/office/powerpoint/2010/main" val="3133002383"/>
+      </p:ext>
+    </p:extLst>
+  </p:cSld>
+  <p:clrMapOvr>
+    <a:masterClrMapping/>
+  </p:clrMapOvr>
+</p:sld>
+</file>
+
+<file path=ppt/slides/slide15.xml><?xml version="1.0" encoding="utf-8"?>
+<p:sld xmlns:a="http://schemas.openxmlformats.org/drawingml/2006/main" xmlns:r="http://schemas.openxmlformats.org/officeDocument/2006/relationships" xmlns:p="http://schemas.openxmlformats.org/presentationml/2006/main">
+  <p:cSld>
+    <p:spTree>
+      <p:nvGrpSpPr>
+        <p:cNvPr id="1" name=""/>
+        <p:cNvGrpSpPr/>
+        <p:nvPr/>
+      </p:nvGrpSpPr>
+      <p:grpSpPr>
+        <a:xfrm>
+          <a:off x="0" y="0"/>
+          <a:ext cx="0" cy="0"/>
+          <a:chOff x="0" y="0"/>
+          <a:chExt cx="0" cy="0"/>
+        </a:xfrm>
+      </p:grpSpPr>
+      <p:sp>
+        <p:nvSpPr>
+          <p:cNvPr id="2" name="TextBox 1">
+            <a:extLst>
+              <a:ext uri="{FF2B5EF4-FFF2-40B4-BE49-F238E27FC236}">
+                <a16:creationId xmlns:a16="http://schemas.microsoft.com/office/drawing/2014/main" id="{12E3C16C-EB33-8FAD-1CCB-86B5F1F466AD}"/>
+              </a:ext>
+            </a:extLst>
+          </p:cNvPr>
+          <p:cNvSpPr txBox="1"/>
+          <p:nvPr/>
+        </p:nvSpPr>
+        <p:spPr>
+          <a:xfrm>
+            <a:off x="5165159" y="3077618"/>
+            <a:ext cx="1866900" cy="701731"/>
+          </a:xfrm>
+          <a:prstGeom prst="rect">
+            <a:avLst/>
+          </a:prstGeom>
+        </p:spPr>
+        <p:txBody>
+          <a:bodyPr lIns="91440" tIns="45720" rIns="91440" bIns="45720" anchor="t"/>
+          <a:lstStyle/>
+          <a:p>
+            <a:pPr>
+              <a:lnSpc>
+                <a:spcPct val="90000"/>
+              </a:lnSpc>
+            </a:pPr>
+            <a:r>
+              <a:rPr lang="en-US" sz="4400" b="1">
+                <a:solidFill>
+                  <a:srgbClr val="1E482A"/>
+                </a:solidFill>
+                <a:latin typeface="Calibri"/>
+                <a:ea typeface="Calibri"/>
+                <a:cs typeface="Calibri"/>
+              </a:rPr>
+              <a:t>Thanks</a:t>
+            </a:r>
+          </a:p>
+        </p:txBody>
+      </p:sp>
+    </p:spTree>
+    <p:extLst>
+      <p:ext uri="{BB962C8B-B14F-4D97-AF65-F5344CB8AC3E}">
+        <p14:creationId xmlns:p14="http://schemas.microsoft.com/office/powerpoint/2010/main" val="1725777591"/>
       </p:ext>
     </p:extLst>
   </p:cSld>
@@ -2256,7 +5078,7 @@
           </a:lstStyle>
           <a:p>
             <a:r>
-              <a:rPr lang="en-US" altLang="en-US" b="1" dirty="0">
+              <a:rPr lang="en-US" altLang="en-US" b="1">
                 <a:solidFill>
                   <a:srgbClr val="1E482A"/>
                 </a:solidFill>
@@ -2468,7 +5290,7 @@
               </a:spcBef>
             </a:pPr>
             <a:r>
-              <a:rPr lang="en-US" altLang="en-US" dirty="0">
+              <a:rPr lang="en-US" altLang="en-US">
                 <a:ea typeface="ＭＳ Ｐゴシック" charset="-128"/>
               </a:rPr>
               <a:t>Modern point of sale (POS) system.</a:t>
@@ -2484,7 +5306,7 @@
               </a:spcBef>
             </a:pPr>
             <a:r>
-              <a:rPr lang="en-US" altLang="en-US" dirty="0">
+              <a:rPr lang="en-US" altLang="en-US">
                 <a:ea typeface="ＭＳ Ｐゴシック" charset="-128"/>
               </a:rPr>
               <a:t>Designed for retail transactions and inventory management.</a:t>
@@ -2500,7 +5322,7 @@
               </a:spcBef>
             </a:pPr>
             <a:r>
-              <a:rPr lang="en-US" altLang="en-US" dirty="0">
+              <a:rPr lang="en-US" altLang="en-US">
                 <a:ea typeface="ＭＳ Ｐゴシック" charset="-128"/>
               </a:rPr>
               <a:t>Supports seamless customer loyalty integration.</a:t>
@@ -2516,7 +5338,7 @@
               </a:spcBef>
             </a:pPr>
             <a:r>
-              <a:rPr lang="en-US" altLang="en-US" dirty="0">
+              <a:rPr lang="en-US" altLang="en-US">
                 <a:ea typeface="ＭＳ Ｐゴシック" charset="-128"/>
               </a:rPr>
               <a:t>Microservice architecture</a:t>
@@ -2532,7 +5354,7 @@
               </a:spcBef>
             </a:pPr>
             <a:r>
-              <a:rPr lang="en-US" altLang="en-US" dirty="0">
+              <a:rPr lang="en-US" altLang="en-US">
                 <a:ea typeface="ＭＳ Ｐゴシック" charset="-128"/>
               </a:rPr>
               <a:t>Inventory Service: Manages products, vendors, and purchase orders.</a:t>
@@ -2548,7 +5370,7 @@
               </a:spcBef>
             </a:pPr>
             <a:r>
-              <a:rPr lang="en-US" altLang="en-US" dirty="0">
+              <a:rPr lang="en-US" altLang="en-US">
                 <a:ea typeface="ＭＳ Ｐゴシック" charset="-128"/>
               </a:rPr>
               <a:t>Loyalty Program Service: Tracks customer loyalty accounts and rewards.</a:t>
@@ -2564,7 +5386,7 @@
               </a:spcBef>
             </a:pPr>
             <a:r>
-              <a:rPr lang="en-US" altLang="en-US" dirty="0">
+              <a:rPr lang="en-US" altLang="en-US">
                 <a:ea typeface="ＭＳ Ｐゴシック" charset="-128"/>
               </a:rPr>
               <a:t>Point of Sale (POS) Service: Handles retail transactions, registers, employees, and customer transaction history.</a:t>
@@ -2579,7 +5401,7 @@
                 <a:spcPts val="0"/>
               </a:spcBef>
             </a:pPr>
-            <a:endParaRPr lang="en-US" altLang="en-US" dirty="0">
+            <a:endParaRPr lang="en-US" altLang="en-US">
               <a:ea typeface="ＭＳ Ｐゴシック" charset="-128"/>
             </a:endParaRPr>
           </a:p>
@@ -2667,7 +5489,7 @@
           </a:lstStyle>
           <a:p>
             <a:r>
-              <a:rPr lang="en-US" altLang="en-US" b="1" dirty="0">
+              <a:rPr lang="en-US" altLang="en-US" b="1">
                 <a:solidFill>
                   <a:srgbClr val="1E482A"/>
                 </a:solidFill>
@@ -2879,7 +5701,7 @@
               </a:spcBef>
             </a:pPr>
             <a:r>
-              <a:rPr lang="en-US" altLang="en-US" dirty="0">
+              <a:rPr lang="en-US" altLang="en-US">
                 <a:ea typeface="ＭＳ Ｐゴシック" charset="-128"/>
               </a:rPr>
               <a:t>Scalability and Maintainability</a:t>
@@ -2895,7 +5717,7 @@
               </a:spcBef>
             </a:pPr>
             <a:r>
-              <a:rPr lang="en-US" altLang="en-US" dirty="0">
+              <a:rPr lang="en-US" altLang="en-US">
                 <a:ea typeface="ＭＳ Ｐゴシック" charset="-128"/>
               </a:rPr>
               <a:t>Decoupled service for independent scaling and updates.</a:t>
@@ -2911,7 +5733,7 @@
               </a:spcBef>
             </a:pPr>
             <a:r>
-              <a:rPr lang="en-US" altLang="en-US" dirty="0">
+              <a:rPr lang="en-US" altLang="en-US">
                 <a:ea typeface="ＭＳ Ｐゴシック" charset="-128"/>
               </a:rPr>
               <a:t>Supports future expansion with additional services.</a:t>
@@ -2927,7 +5749,7 @@
               </a:spcBef>
             </a:pPr>
             <a:r>
-              <a:rPr lang="en-US" altLang="en-US" dirty="0">
+              <a:rPr lang="en-US" altLang="en-US">
                 <a:ea typeface="ＭＳ Ｐゴシック" charset="-128"/>
               </a:rPr>
               <a:t>Cloud Native and Containerized</a:t>
@@ -2943,7 +5765,7 @@
               </a:spcBef>
             </a:pPr>
             <a:r>
-              <a:rPr lang="en-US" altLang="en-US" dirty="0">
+              <a:rPr lang="en-US" altLang="en-US">
                 <a:ea typeface="ＭＳ Ｐゴシック" charset="-128"/>
               </a:rPr>
               <a:t>Uses Spring Boot and Spring Cloud for microservices.</a:t>
@@ -2959,7 +5781,7 @@
               </a:spcBef>
             </a:pPr>
             <a:r>
-              <a:rPr lang="en-US" altLang="en-US" dirty="0">
+              <a:rPr lang="en-US" altLang="en-US">
                 <a:ea typeface="ＭＳ Ｐゴシック" charset="-128"/>
               </a:rPr>
               <a:t>Deployed via Docker and managed with Docker Compose.</a:t>
@@ -2974,7 +5796,7 @@
                 <a:spcPts val="0"/>
               </a:spcBef>
             </a:pPr>
-            <a:endParaRPr lang="en-US" altLang="en-US" dirty="0">
+            <a:endParaRPr lang="en-US" altLang="en-US">
               <a:ea typeface="ＭＳ Ｐゴシック" charset="-128"/>
             </a:endParaRPr>
           </a:p>
@@ -3062,7 +5884,7 @@
           </a:lstStyle>
           <a:p>
             <a:r>
-              <a:rPr lang="en-US" altLang="en-US" b="1" dirty="0">
+              <a:rPr lang="en-US" altLang="en-US" b="1">
                 <a:solidFill>
                   <a:srgbClr val="1E482A"/>
                 </a:solidFill>
@@ -3274,7 +6096,7 @@
               </a:spcBef>
             </a:pPr>
             <a:r>
-              <a:rPr lang="en-US" altLang="en-US" dirty="0">
+              <a:rPr lang="en-US" altLang="en-US">
                 <a:ea typeface="ＭＳ Ｐゴシック" charset="-128"/>
               </a:rPr>
               <a:t>Centralized Configuration Management</a:t>
@@ -3290,7 +6112,7 @@
               </a:spcBef>
             </a:pPr>
             <a:r>
-              <a:rPr lang="en-US" altLang="en-US" dirty="0">
+              <a:rPr lang="en-US" altLang="en-US">
                 <a:ea typeface="ＭＳ Ｐゴシック" charset="-128"/>
               </a:rPr>
               <a:t>Spring Cloud Config Server ensures consistent settings across environments.</a:t>
@@ -3306,7 +6128,7 @@
               </a:spcBef>
             </a:pPr>
             <a:r>
-              <a:rPr lang="en-US" altLang="en-US" dirty="0">
+              <a:rPr lang="en-US" altLang="en-US">
                 <a:ea typeface="ＭＳ Ｐゴシック" charset="-128"/>
               </a:rPr>
               <a:t>Configuration stored in a dedicated Git repository for version control.</a:t>
@@ -3322,7 +6144,7 @@
               </a:spcBef>
             </a:pPr>
             <a:r>
-              <a:rPr lang="en-US" altLang="en-US" dirty="0">
+              <a:rPr lang="en-US" altLang="en-US">
                 <a:ea typeface="ＭＳ Ｐゴシック" charset="-128"/>
               </a:rPr>
               <a:t>Real-World Application</a:t>
@@ -3338,7 +6160,7 @@
               </a:spcBef>
             </a:pPr>
             <a:r>
-              <a:rPr lang="en-US" altLang="en-US" dirty="0">
+              <a:rPr lang="en-US" altLang="en-US">
                 <a:ea typeface="ＭＳ Ｐゴシック" charset="-128"/>
               </a:rPr>
               <a:t>Designed for businesses needing robust transaction, inventory, and customer loyalty solutions.</a:t>
@@ -3354,7 +6176,7 @@
               </a:spcBef>
             </a:pPr>
             <a:r>
-              <a:rPr lang="en-US" altLang="en-US" dirty="0">
+              <a:rPr lang="en-US" altLang="en-US">
                 <a:ea typeface="ＭＳ Ｐゴシック" charset="-128"/>
               </a:rPr>
               <a:t>Flexible and extensible for diverse retail environments.</a:t>
@@ -3369,7 +6191,7 @@
                 <a:spcPts val="0"/>
               </a:spcBef>
             </a:pPr>
-            <a:endParaRPr lang="en-US" altLang="en-US" dirty="0">
+            <a:endParaRPr lang="en-US" altLang="en-US">
               <a:ea typeface="ＭＳ Ｐゴシック" charset="-128"/>
             </a:endParaRPr>
           </a:p>
@@ -3457,7 +6279,7 @@
           </a:lstStyle>
           <a:p>
             <a:r>
-              <a:rPr lang="en-US" altLang="en-US" b="1" dirty="0">
+              <a:rPr lang="en-US" altLang="en-US" b="1">
                 <a:solidFill>
                   <a:srgbClr val="1E482A"/>
                 </a:solidFill>
@@ -3668,7 +6490,7 @@
                 <a:spcPts val="0"/>
               </a:spcBef>
             </a:pPr>
-            <a:endParaRPr lang="en-US" altLang="en-US" dirty="0">
+            <a:endParaRPr lang="en-US" altLang="en-US">
               <a:ea typeface="ＭＳ Ｐゴシック" charset="-128"/>
             </a:endParaRPr>
           </a:p>
@@ -3792,7 +6614,7 @@
           </a:lstStyle>
           <a:p>
             <a:r>
-              <a:rPr lang="en-US" altLang="en-US" b="1" dirty="0">
+              <a:rPr lang="en-US" altLang="en-US" b="1">
                 <a:solidFill>
                   <a:srgbClr val="1E482A"/>
                 </a:solidFill>
@@ -4004,7 +6826,7 @@
               </a:spcBef>
             </a:pPr>
             <a:r>
-              <a:rPr lang="en-US" altLang="en-US" dirty="0">
+              <a:rPr lang="en-US" altLang="en-US">
                 <a:ea typeface="ＭＳ Ｐゴシック" charset="-128"/>
               </a:rPr>
               <a:t>The canonical model was analyzed against business functions to develop the bounded contexts of the application:</a:t>
@@ -4020,7 +6842,7 @@
               </a:spcBef>
             </a:pPr>
             <a:r>
-              <a:rPr lang="en-US" altLang="en-US" sz="2800" dirty="0">
+              <a:rPr lang="en-US" altLang="en-US" sz="2800">
                 <a:ea typeface="ＭＳ Ｐゴシック" charset="-128"/>
               </a:rPr>
               <a:t>Identified business functions</a:t>
@@ -4036,7 +6858,7 @@
               </a:spcBef>
             </a:pPr>
             <a:r>
-              <a:rPr lang="en-US" altLang="en-US" sz="2800" dirty="0">
+              <a:rPr lang="en-US" altLang="en-US" sz="2800">
                 <a:ea typeface="ＭＳ Ｐゴシック" charset="-128"/>
               </a:rPr>
               <a:t>Retail transactions and management</a:t>
@@ -4052,7 +6874,7 @@
               </a:spcBef>
             </a:pPr>
             <a:r>
-              <a:rPr lang="en-US" altLang="en-US" sz="2800" dirty="0">
+              <a:rPr lang="en-US" altLang="en-US" sz="2800">
                 <a:ea typeface="ＭＳ Ｐゴシック" charset="-128"/>
               </a:rPr>
               <a:t>Inventory management and vendor management</a:t>
@@ -4068,7 +6890,7 @@
               </a:spcBef>
             </a:pPr>
             <a:r>
-              <a:rPr lang="en-US" altLang="en-US" sz="2800" dirty="0">
+              <a:rPr lang="en-US" altLang="en-US" sz="2800">
                 <a:ea typeface="ＭＳ Ｐゴシック" charset="-128"/>
               </a:rPr>
               <a:t>Loyalty and rewards tracking</a:t>
@@ -4084,7 +6906,7 @@
               </a:spcBef>
             </a:pPr>
             <a:r>
-              <a:rPr lang="en-US" altLang="en-US" sz="2800" dirty="0">
+              <a:rPr lang="en-US" altLang="en-US" sz="2800">
                 <a:ea typeface="ＭＳ Ｐゴシック" charset="-128"/>
               </a:rPr>
               <a:t>Can be extended to add additional features, such as targeted marketing communications</a:t>
@@ -4099,7 +6921,7 @@
                 <a:spcPts val="0"/>
               </a:spcBef>
             </a:pPr>
-            <a:endParaRPr lang="en-US" altLang="en-US" dirty="0">
+            <a:endParaRPr lang="en-US" altLang="en-US">
               <a:ea typeface="ＭＳ Ｐゴシック" charset="-128"/>
             </a:endParaRPr>
           </a:p>
@@ -4187,7 +7009,7 @@
           </a:lstStyle>
           <a:p>
             <a:r>
-              <a:rPr lang="en-US" altLang="en-US" b="1" dirty="0">
+              <a:rPr lang="en-US" altLang="en-US" b="1">
                 <a:solidFill>
                   <a:srgbClr val="1E482A"/>
                 </a:solidFill>
@@ -4398,7 +7220,7 @@
                 <a:spcPts val="0"/>
               </a:spcBef>
             </a:pPr>
-            <a:endParaRPr lang="en-US" altLang="en-US" dirty="0">
+            <a:endParaRPr lang="en-US" altLang="en-US">
               <a:ea typeface="ＭＳ Ｐゴシック" charset="-128"/>
             </a:endParaRPr>
           </a:p>
@@ -4594,7 +7416,7 @@
           </a:lstStyle>
           <a:p>
             <a:r>
-              <a:rPr lang="en-US" altLang="en-US" b="1" dirty="0">
+              <a:rPr lang="en-US" altLang="en-US" b="1">
                 <a:solidFill>
                   <a:srgbClr val="1E482A"/>
                 </a:solidFill>
@@ -4805,7 +7627,7 @@
                 <a:spcPts val="0"/>
               </a:spcBef>
             </a:pPr>
-            <a:endParaRPr lang="en-US" altLang="en-US" dirty="0">
+            <a:endParaRPr lang="en-US" altLang="en-US">
               <a:ea typeface="ＭＳ Ｐゴシック" charset="-128"/>
             </a:endParaRPr>
           </a:p>
@@ -4868,7 +7690,7 @@
         <p:cNvPr id="1" name="">
           <a:extLst>
             <a:ext uri="{FF2B5EF4-FFF2-40B4-BE49-F238E27FC236}">
-              <a16:creationId xmlns:a16="http://schemas.microsoft.com/office/drawing/2014/main" id="{F1821901-CC72-2FAE-EF02-6CC728D5E9EC}"/>
+              <a16:creationId xmlns:a16="http://schemas.microsoft.com/office/drawing/2014/main" id="{1D5BB25E-0F1D-9E2C-13B1-82A99C5E869D}"/>
             </a:ext>
           </a:extLst>
         </p:cNvPr>
@@ -4888,7 +7710,7 @@
           <p:cNvPr id="2" name="Title 1">
             <a:extLst>
               <a:ext uri="{FF2B5EF4-FFF2-40B4-BE49-F238E27FC236}">
-                <a16:creationId xmlns:a16="http://schemas.microsoft.com/office/drawing/2014/main" id="{2AE48923-8E0C-6B2D-BF43-2FAB857C83B1}"/>
+                <a16:creationId xmlns:a16="http://schemas.microsoft.com/office/drawing/2014/main" id="{31DF4D76-F1E6-E0E1-07EE-441B6EEE5F77}"/>
               </a:ext>
             </a:extLst>
           </p:cNvPr>
@@ -4907,7 +7729,7 @@
           </a:prstGeom>
         </p:spPr>
         <p:txBody>
-          <a:bodyPr/>
+          <a:bodyPr lIns="91440" tIns="45720" rIns="91440" bIns="45720" anchor="t"/>
           <a:lstStyle>
             <a:lvl1pPr algn="l" defTabSz="914400" rtl="0" eaLnBrk="1" latinLnBrk="0" hangingPunct="1">
               <a:lnSpc>
@@ -4929,16 +7751,24 @@
           </a:lstStyle>
           <a:p>
             <a:r>
-              <a:rPr lang="en-US" altLang="en-US" b="1" dirty="0">
+              <a:rPr lang="en-US" altLang="en-US" b="1">
                 <a:solidFill>
                   <a:srgbClr val="1E482A"/>
                 </a:solidFill>
-                <a:latin typeface="Calibri" charset="0"/>
-                <a:ea typeface="Calibri" charset="0"/>
-                <a:cs typeface="Calibri" charset="0"/>
+                <a:latin typeface="Calibri"/>
+                <a:ea typeface="Calibri"/>
+                <a:cs typeface="Calibri"/>
               </a:rPr>
-              <a:t>Running the Application</a:t>
+              <a:t>Package Diagram</a:t>
             </a:r>
+            <a:endParaRPr lang="en-US" altLang="en-US" b="1">
+              <a:solidFill>
+                <a:srgbClr val="1E482A"/>
+              </a:solidFill>
+              <a:latin typeface="Calibri" charset="0"/>
+              <a:ea typeface="Calibri" charset="0"/>
+              <a:cs typeface="Calibri" charset="0"/>
+            </a:endParaRPr>
           </a:p>
         </p:txBody>
       </p:sp>
@@ -4947,7 +7777,7 @@
           <p:cNvPr id="3" name="Content Placeholder 2">
             <a:extLst>
               <a:ext uri="{FF2B5EF4-FFF2-40B4-BE49-F238E27FC236}">
-                <a16:creationId xmlns:a16="http://schemas.microsoft.com/office/drawing/2014/main" id="{AC600985-D61C-AE8F-5018-2AF84F631F4A}"/>
+                <a16:creationId xmlns:a16="http://schemas.microsoft.com/office/drawing/2014/main" id="{3ADBC067-DB81-316F-B855-A9EE62998CE6}"/>
               </a:ext>
             </a:extLst>
           </p:cNvPr>
@@ -5140,7 +7970,7 @@
                 <a:spcPts val="0"/>
               </a:spcBef>
             </a:pPr>
-            <a:endParaRPr lang="en-US" altLang="en-US" dirty="0">
+            <a:endParaRPr lang="en-US" altLang="en-US">
               <a:ea typeface="ＭＳ Ｐゴシック" charset="-128"/>
             </a:endParaRPr>
           </a:p>
@@ -5148,10 +7978,10 @@
       </p:sp>
       <p:pic>
         <p:nvPicPr>
-          <p:cNvPr id="5" name="Picture 4" descr="A screenshot of a computer&#10;&#10;AI-generated content may be incorrect.">
+          <p:cNvPr id="4" name="Picture 3" descr="A blue screen shot of a blue folder&#10;&#10;AI-generated content may be incorrect.">
             <a:extLst>
               <a:ext uri="{FF2B5EF4-FFF2-40B4-BE49-F238E27FC236}">
-                <a16:creationId xmlns:a16="http://schemas.microsoft.com/office/drawing/2014/main" id="{7C0BFD20-B9E9-CB3A-0840-8A88A4D37B99}"/>
+                <a16:creationId xmlns:a16="http://schemas.microsoft.com/office/drawing/2014/main" id="{6DA0F377-A74A-E11E-7016-367D25F2B41D}"/>
               </a:ext>
             </a:extLst>
           </p:cNvPr>
@@ -5161,66 +7991,85 @@
           <p:nvPr/>
         </p:nvPicPr>
         <p:blipFill>
-          <a:blip r:embed="rId3">
-            <a:extLst>
-              <a:ext uri="{28A0092B-C50C-407E-A947-70E740481C1C}">
-                <a14:useLocalDpi xmlns:a14="http://schemas.microsoft.com/office/drawing/2010/main" val="0"/>
-              </a:ext>
-            </a:extLst>
-          </a:blip>
+          <a:blip r:embed="rId3"/>
           <a:stretch>
             <a:fillRect/>
           </a:stretch>
         </p:blipFill>
         <p:spPr>
           <a:xfrm>
-            <a:off x="3287102" y="1374347"/>
-            <a:ext cx="7736336" cy="4594505"/>
+            <a:off x="2641469" y="1504950"/>
+            <a:ext cx="3222887" cy="5153025"/>
           </a:xfrm>
           <a:prstGeom prst="rect">
             <a:avLst/>
           </a:prstGeom>
         </p:spPr>
       </p:pic>
-      <p:sp>
-        <p:nvSpPr>
-          <p:cNvPr id="6" name="TextBox 5">
+      <p:pic>
+        <p:nvPicPr>
+          <p:cNvPr id="7" name="Picture 6" descr="A blue screen shot of a blue screen&#10;&#10;AI-generated content may be incorrect.">
             <a:extLst>
               <a:ext uri="{FF2B5EF4-FFF2-40B4-BE49-F238E27FC236}">
-                <a16:creationId xmlns:a16="http://schemas.microsoft.com/office/drawing/2014/main" id="{8046B08F-622B-9246-4D7B-8C7799A9C2A9}"/>
+                <a16:creationId xmlns:a16="http://schemas.microsoft.com/office/drawing/2014/main" id="{85A21BF1-811F-D95B-03B9-8A50529CA514}"/>
               </a:ext>
             </a:extLst>
           </p:cNvPr>
-          <p:cNvSpPr txBox="1"/>
+          <p:cNvPicPr>
+            <a:picLocks noChangeAspect="1"/>
+          </p:cNvPicPr>
           <p:nvPr/>
-        </p:nvSpPr>
+        </p:nvPicPr>
+        <p:blipFill>
+          <a:blip r:embed="rId4"/>
+          <a:stretch>
+            <a:fillRect/>
+          </a:stretch>
+        </p:blipFill>
         <p:spPr>
           <a:xfrm>
-            <a:off x="3044689" y="6276925"/>
-            <a:ext cx="8221161" cy="369332"/>
+            <a:off x="6194112" y="1504950"/>
+            <a:ext cx="2642226" cy="5153025"/>
           </a:xfrm>
           <a:prstGeom prst="rect">
             <a:avLst/>
           </a:prstGeom>
-          <a:noFill/>
         </p:spPr>
-        <p:txBody>
-          <a:bodyPr wrap="none" rtlCol="0">
-            <a:spAutoFit/>
-          </a:bodyPr>
-          <a:lstStyle/>
-          <a:p>
-            <a:r>
-              <a:rPr lang="en-US" dirty="0"/>
-              <a:t>Visit https://github.com/Matt-Hays/csi-5347-course-project for more information.</a:t>
-            </a:r>
-          </a:p>
-        </p:txBody>
-      </p:sp>
+      </p:pic>
+      <p:pic>
+        <p:nvPicPr>
+          <p:cNvPr id="8" name="Picture 7" descr="A blue screen shot of a blue folder&#10;&#10;AI-generated content may be incorrect.">
+            <a:extLst>
+              <a:ext uri="{FF2B5EF4-FFF2-40B4-BE49-F238E27FC236}">
+                <a16:creationId xmlns:a16="http://schemas.microsoft.com/office/drawing/2014/main" id="{6541432F-C446-0DC6-0384-1EA0A0510B4B}"/>
+              </a:ext>
+            </a:extLst>
+          </p:cNvPr>
+          <p:cNvPicPr>
+            <a:picLocks noChangeAspect="1"/>
+          </p:cNvPicPr>
+          <p:nvPr/>
+        </p:nvPicPr>
+        <p:blipFill>
+          <a:blip r:embed="rId5"/>
+          <a:stretch>
+            <a:fillRect/>
+          </a:stretch>
+        </p:blipFill>
+        <p:spPr>
+          <a:xfrm>
+            <a:off x="9166900" y="1504950"/>
+            <a:ext cx="2640249" cy="5153025"/>
+          </a:xfrm>
+          <a:prstGeom prst="rect">
+            <a:avLst/>
+          </a:prstGeom>
+        </p:spPr>
+      </p:pic>
     </p:spTree>
     <p:extLst>
       <p:ext uri="{BB962C8B-B14F-4D97-AF65-F5344CB8AC3E}">
-        <p14:creationId xmlns:p14="http://schemas.microsoft.com/office/powerpoint/2010/main" val="3228207406"/>
+        <p14:creationId xmlns:p14="http://schemas.microsoft.com/office/powerpoint/2010/main" val="4210925812"/>
       </p:ext>
     </p:extLst>
   </p:cSld>

</xml_diff>